<commit_message>
added conclusion and outlook
</commit_message>
<xml_diff>
--- a/Presentation_FaceToCartoon.pptx
+++ b/Presentation_FaceToCartoon.pptx
@@ -2,21 +2,22 @@
 <file path=ppt/presentation.xml><?xml version="1.0" encoding="utf-8"?>
 <p:presentation xmlns:a="http://schemas.openxmlformats.org/drawingml/2006/main" xmlns:r="http://schemas.openxmlformats.org/officeDocument/2006/relationships" xmlns:p="http://schemas.openxmlformats.org/presentationml/2006/main">
   <p:sldMasterIdLst>
-    <p:sldMasterId id="2147483648" r:id="rId5"/>
+    <p:sldMasterId id="2147483648" r:id="rId1"/>
   </p:sldMasterIdLst>
   <p:notesMasterIdLst>
-    <p:notesMasterId r:id="rId7"/>
+    <p:notesMasterId r:id="rId12"/>
   </p:notesMasterIdLst>
   <p:sldIdLst>
-    <p:sldId id="256" r:id="rId8"/>
-    <p:sldId id="257" r:id="rId9"/>
-    <p:sldId id="258" r:id="rId10"/>
-    <p:sldId id="259" r:id="rId11"/>
-    <p:sldId id="260" r:id="rId12"/>
-    <p:sldId id="261" r:id="rId13"/>
-    <p:sldId id="262" r:id="rId14"/>
-    <p:sldId id="263" r:id="rId15"/>
-    <p:sldId id="264" r:id="rId16"/>
+    <p:sldId id="256" r:id="rId2"/>
+    <p:sldId id="257" r:id="rId3"/>
+    <p:sldId id="258" r:id="rId4"/>
+    <p:sldId id="259" r:id="rId5"/>
+    <p:sldId id="260" r:id="rId6"/>
+    <p:sldId id="261" r:id="rId7"/>
+    <p:sldId id="262" r:id="rId8"/>
+    <p:sldId id="263" r:id="rId9"/>
+    <p:sldId id="265" r:id="rId10"/>
+    <p:sldId id="264" r:id="rId11"/>
   </p:sldIdLst>
   <p:sldSz cx="12192000" cy="6858000"/>
   <p:notesSz cx="6858000" cy="9144000"/>
@@ -36,7 +37,7 @@
       <a:buFontTx/>
       <a:buNone/>
       <a:tabLst/>
-      <a:defRPr b="0" baseline="0" cap="none" i="0" spc="0" strike="noStrike" sz="1800" u="none" kumimoji="0" normalizeH="0">
+      <a:defRPr kumimoji="0" sz="1800" b="0" i="0" u="none" strike="noStrike" cap="none" spc="0" normalizeH="0" baseline="0">
         <a:ln>
           <a:noFill/>
         </a:ln>
@@ -62,7 +63,7 @@
       <a:buFontTx/>
       <a:buNone/>
       <a:tabLst/>
-      <a:defRPr b="0" baseline="0" cap="none" i="0" spc="0" strike="noStrike" sz="1800" u="none" kumimoji="0" normalizeH="0">
+      <a:defRPr kumimoji="0" sz="1800" b="0" i="0" u="none" strike="noStrike" cap="none" spc="0" normalizeH="0" baseline="0">
         <a:ln>
           <a:noFill/>
         </a:ln>
@@ -92,7 +93,7 @@
       <a:buFontTx/>
       <a:buNone/>
       <a:tabLst/>
-      <a:defRPr b="0" baseline="0" cap="none" i="0" spc="0" strike="noStrike" sz="1800" u="none" kumimoji="0" normalizeH="0">
+      <a:defRPr kumimoji="0" sz="1800" b="0" i="0" u="none" strike="noStrike" cap="none" spc="0" normalizeH="0" baseline="0">
         <a:ln>
           <a:noFill/>
         </a:ln>
@@ -122,7 +123,7 @@
       <a:buFontTx/>
       <a:buNone/>
       <a:tabLst/>
-      <a:defRPr b="0" baseline="0" cap="none" i="0" spc="0" strike="noStrike" sz="1800" u="none" kumimoji="0" normalizeH="0">
+      <a:defRPr kumimoji="0" sz="1800" b="0" i="0" u="none" strike="noStrike" cap="none" spc="0" normalizeH="0" baseline="0">
         <a:ln>
           <a:noFill/>
         </a:ln>
@@ -152,7 +153,7 @@
       <a:buFontTx/>
       <a:buNone/>
       <a:tabLst/>
-      <a:defRPr b="0" baseline="0" cap="none" i="0" spc="0" strike="noStrike" sz="1800" u="none" kumimoji="0" normalizeH="0">
+      <a:defRPr kumimoji="0" sz="1800" b="0" i="0" u="none" strike="noStrike" cap="none" spc="0" normalizeH="0" baseline="0">
         <a:ln>
           <a:noFill/>
         </a:ln>
@@ -182,7 +183,7 @@
       <a:buFontTx/>
       <a:buNone/>
       <a:tabLst/>
-      <a:defRPr b="0" baseline="0" cap="none" i="0" spc="0" strike="noStrike" sz="1800" u="none" kumimoji="0" normalizeH="0">
+      <a:defRPr kumimoji="0" sz="1800" b="0" i="0" u="none" strike="noStrike" cap="none" spc="0" normalizeH="0" baseline="0">
         <a:ln>
           <a:noFill/>
         </a:ln>
@@ -212,7 +213,7 @@
       <a:buFontTx/>
       <a:buNone/>
       <a:tabLst/>
-      <a:defRPr b="0" baseline="0" cap="none" i="0" spc="0" strike="noStrike" sz="1800" u="none" kumimoji="0" normalizeH="0">
+      <a:defRPr kumimoji="0" sz="1800" b="0" i="0" u="none" strike="noStrike" cap="none" spc="0" normalizeH="0" baseline="0">
         <a:ln>
           <a:noFill/>
         </a:ln>
@@ -242,7 +243,7 @@
       <a:buFontTx/>
       <a:buNone/>
       <a:tabLst/>
-      <a:defRPr b="0" baseline="0" cap="none" i="0" spc="0" strike="noStrike" sz="1800" u="none" kumimoji="0" normalizeH="0">
+      <a:defRPr kumimoji="0" sz="1800" b="0" i="0" u="none" strike="noStrike" cap="none" spc="0" normalizeH="0" baseline="0">
         <a:ln>
           <a:noFill/>
         </a:ln>
@@ -272,7 +273,7 @@
       <a:buFontTx/>
       <a:buNone/>
       <a:tabLst/>
-      <a:defRPr b="0" baseline="0" cap="none" i="0" spc="0" strike="noStrike" sz="1800" u="none" kumimoji="0" normalizeH="0">
+      <a:defRPr kumimoji="0" sz="1800" b="0" i="0" u="none" strike="noStrike" cap="none" spc="0" normalizeH="0" baseline="0">
         <a:ln>
           <a:noFill/>
         </a:ln>
@@ -302,7 +303,7 @@
       <a:buFontTx/>
       <a:buNone/>
       <a:tabLst/>
-      <a:defRPr b="0" baseline="0" cap="none" i="0" spc="0" strike="noStrike" sz="1800" u="none" kumimoji="0" normalizeH="0">
+      <a:defRPr kumimoji="0" sz="1800" b="0" i="0" u="none" strike="noStrike" cap="none" spc="0" normalizeH="0" baseline="0">
         <a:ln>
           <a:noFill/>
         </a:ln>
@@ -321,13 +322,14 @@
 </p:presentation>
 </file>
 
-<file path=ppt/commentAuthors.xml><?xml version="1.0" encoding="utf-8"?>
-<p:cmAuthorLst xmlns:a="http://schemas.openxmlformats.org/drawingml/2006/main" xmlns:r="http://schemas.openxmlformats.org/officeDocument/2006/relationships" xmlns:p="http://schemas.openxmlformats.org/presentationml/2006/main"/>
-</file>
-
 <file path=ppt/notesMasters/notesMaster1.xml><?xml version="1.0" encoding="utf-8"?>
 <p:notesMaster xmlns:a="http://schemas.openxmlformats.org/drawingml/2006/main" xmlns:r="http://schemas.openxmlformats.org/officeDocument/2006/relationships" xmlns:p="http://schemas.openxmlformats.org/presentationml/2006/main">
   <p:cSld>
+    <p:bg>
+      <p:bgRef idx="1001">
+        <a:schemeClr val="bg1"/>
+      </p:bgRef>
+    </p:bg>
     <p:spTree>
       <p:nvGrpSpPr>
         <p:cNvPr id="1" name=""/>
@@ -345,7 +347,9 @@
       <p:sp>
         <p:nvSpPr>
           <p:cNvPr id="118" name="Shape 118"/>
-          <p:cNvSpPr/>
+          <p:cNvSpPr>
+            <a:spLocks noGrp="1" noRot="1" noChangeAspect="1"/>
+          </p:cNvSpPr>
           <p:nvPr>
             <p:ph type="sldImg"/>
           </p:nvPr>
@@ -363,14 +367,16 @@
           <a:bodyPr/>
           <a:lstStyle/>
           <a:p>
-            <a:pPr/>
+            <a:endParaRPr/>
           </a:p>
         </p:txBody>
       </p:sp>
       <p:sp>
         <p:nvSpPr>
           <p:cNvPr id="119" name="Shape 119"/>
-          <p:cNvSpPr/>
+          <p:cNvSpPr>
+            <a:spLocks noGrp="1"/>
+          </p:cNvSpPr>
           <p:nvPr>
             <p:ph type="body" sz="quarter" idx="1"/>
           </p:nvPr>
@@ -388,7 +394,7 @@
           <a:bodyPr/>
           <a:lstStyle/>
           <a:p>
-            <a:pPr/>
+            <a:endParaRPr/>
           </a:p>
         </p:txBody>
       </p:sp>
@@ -472,8 +478,246 @@
 </p:notesMaster>
 </file>
 
+<file path=ppt/notesSlides/notesSlide1.xml><?xml version="1.0" encoding="utf-8"?>
+<p:notes xmlns:a="http://schemas.openxmlformats.org/drawingml/2006/main" xmlns:r="http://schemas.openxmlformats.org/officeDocument/2006/relationships" xmlns:p="http://schemas.openxmlformats.org/presentationml/2006/main">
+  <p:cSld>
+    <p:spTree>
+      <p:nvGrpSpPr>
+        <p:cNvPr id="1" name=""/>
+        <p:cNvGrpSpPr/>
+        <p:nvPr/>
+      </p:nvGrpSpPr>
+      <p:grpSpPr>
+        <a:xfrm>
+          <a:off x="0" y="0"/>
+          <a:ext cx="0" cy="0"/>
+          <a:chOff x="0" y="0"/>
+          <a:chExt cx="0" cy="0"/>
+        </a:xfrm>
+      </p:grpSpPr>
+      <p:sp>
+        <p:nvSpPr>
+          <p:cNvPr id="2" name="Slide Image Placeholder 1"/>
+          <p:cNvSpPr>
+            <a:spLocks noGrp="1" noRot="1" noChangeAspect="1"/>
+          </p:cNvSpPr>
+          <p:nvPr>
+            <p:ph type="sldImg"/>
+          </p:nvPr>
+        </p:nvSpPr>
+        <p:spPr>
+          <a:xfrm>
+            <a:off x="381000" y="685800"/>
+            <a:ext cx="6096000" cy="3429000"/>
+          </a:xfrm>
+        </p:spPr>
+      </p:sp>
+      <p:sp>
+        <p:nvSpPr>
+          <p:cNvPr id="3" name="Notes Placeholder 2"/>
+          <p:cNvSpPr>
+            <a:spLocks noGrp="1"/>
+          </p:cNvSpPr>
+          <p:nvPr>
+            <p:ph type="body" idx="1"/>
+          </p:nvPr>
+        </p:nvSpPr>
+        <p:spPr/>
+        <p:txBody>
+          <a:bodyPr/>
+          <a:lstStyle/>
+          <a:p>
+            <a:pPr marL="171450" indent="-171450">
+              <a:buFont typeface="Arial" panose="020B0604020202020204" pitchFamily="34" charset="0"/>
+              <a:buChar char="•"/>
+            </a:pPr>
+            <a:r>
+              <a:rPr lang="en-US" dirty="0"/>
+              <a:t>Some features are preserved: beards, glasses</a:t>
+            </a:r>
+          </a:p>
+          <a:p>
+            <a:pPr marL="171450" indent="-171450">
+              <a:buFont typeface="Arial" panose="020B0604020202020204" pitchFamily="34" charset="0"/>
+              <a:buChar char="•"/>
+            </a:pPr>
+            <a:r>
+              <a:rPr lang="en-US" dirty="0"/>
+              <a:t>With landmark losses, can be extended in a natural way -&gt; although some limitations</a:t>
+            </a:r>
+          </a:p>
+          <a:p>
+            <a:pPr marL="171450" indent="-171450">
+              <a:buFont typeface="Arial" panose="020B0604020202020204" pitchFamily="34" charset="0"/>
+              <a:buChar char="•"/>
+            </a:pPr>
+            <a:r>
+              <a:rPr lang="en-US" dirty="0"/>
+              <a:t>For meaningful results training of 24 to 36 hours were required -&gt; each result had to be analyzed and discussed</a:t>
+            </a:r>
+          </a:p>
+          <a:p>
+            <a:pPr marL="171450" indent="-171450">
+              <a:buFont typeface="Arial" panose="020B0604020202020204" pitchFamily="34" charset="0"/>
+              <a:buChar char="•"/>
+            </a:pPr>
+            <a:endParaRPr lang="en-US" dirty="0"/>
+          </a:p>
+          <a:p>
+            <a:pPr marL="171450" indent="-171450">
+              <a:buFont typeface="Arial" panose="020B0604020202020204" pitchFamily="34" charset="0"/>
+              <a:buChar char="•"/>
+            </a:pPr>
+            <a:endParaRPr lang="en-US" dirty="0"/>
+          </a:p>
+        </p:txBody>
+      </p:sp>
+    </p:spTree>
+    <p:extLst>
+      <p:ext uri="{BB962C8B-B14F-4D97-AF65-F5344CB8AC3E}">
+        <p14:creationId xmlns:p14="http://schemas.microsoft.com/office/powerpoint/2010/main" val="1138317703"/>
+      </p:ext>
+    </p:extLst>
+  </p:cSld>
+  <p:clrMapOvr>
+    <a:masterClrMapping/>
+  </p:clrMapOvr>
+</p:notes>
+</file>
+
+<file path=ppt/notesSlides/notesSlide2.xml><?xml version="1.0" encoding="utf-8"?>
+<p:notes xmlns:a="http://schemas.openxmlformats.org/drawingml/2006/main" xmlns:r="http://schemas.openxmlformats.org/officeDocument/2006/relationships" xmlns:p="http://schemas.openxmlformats.org/presentationml/2006/main">
+  <p:cSld>
+    <p:spTree>
+      <p:nvGrpSpPr>
+        <p:cNvPr id="1" name=""/>
+        <p:cNvGrpSpPr/>
+        <p:nvPr/>
+      </p:nvGrpSpPr>
+      <p:grpSpPr>
+        <a:xfrm>
+          <a:off x="0" y="0"/>
+          <a:ext cx="0" cy="0"/>
+          <a:chOff x="0" y="0"/>
+          <a:chExt cx="0" cy="0"/>
+        </a:xfrm>
+      </p:grpSpPr>
+      <p:sp>
+        <p:nvSpPr>
+          <p:cNvPr id="2" name="Slide Image Placeholder 1"/>
+          <p:cNvSpPr>
+            <a:spLocks noGrp="1" noRot="1" noChangeAspect="1"/>
+          </p:cNvSpPr>
+          <p:nvPr>
+            <p:ph type="sldImg"/>
+          </p:nvPr>
+        </p:nvSpPr>
+        <p:spPr>
+          <a:xfrm>
+            <a:off x="381000" y="685800"/>
+            <a:ext cx="6096000" cy="3429000"/>
+          </a:xfrm>
+        </p:spPr>
+      </p:sp>
+      <p:sp>
+        <p:nvSpPr>
+          <p:cNvPr id="3" name="Notes Placeholder 2"/>
+          <p:cNvSpPr>
+            <a:spLocks noGrp="1"/>
+          </p:cNvSpPr>
+          <p:nvPr>
+            <p:ph type="body" idx="1"/>
+          </p:nvPr>
+        </p:nvSpPr>
+        <p:spPr/>
+        <p:txBody>
+          <a:bodyPr/>
+          <a:lstStyle/>
+          <a:p>
+            <a:pPr marL="171450" indent="-171450">
+              <a:buFont typeface="Arial" panose="020B0604020202020204" pitchFamily="34" charset="0"/>
+              <a:buChar char="•"/>
+            </a:pPr>
+            <a:r>
+              <a:rPr lang="en-US" dirty="0"/>
+              <a:t>More landmarks -&gt; for ear and hair</a:t>
+            </a:r>
+          </a:p>
+          <a:p>
+            <a:pPr marL="171450" indent="-171450">
+              <a:buFont typeface="Arial" panose="020B0604020202020204" pitchFamily="34" charset="0"/>
+              <a:buChar char="•"/>
+            </a:pPr>
+            <a:r>
+              <a:rPr lang="en-US" dirty="0"/>
+              <a:t>Background sensitive to illumination and view point</a:t>
+            </a:r>
+          </a:p>
+          <a:p>
+            <a:pPr marL="171450" indent="-171450">
+              <a:buFont typeface="Arial" panose="020B0604020202020204" pitchFamily="34" charset="0"/>
+              <a:buChar char="•"/>
+            </a:pPr>
+            <a:r>
+              <a:rPr lang="en-US" dirty="0"/>
+              <a:t>Another way to increase performance: identify background in the real images and set it to white</a:t>
+            </a:r>
+          </a:p>
+          <a:p>
+            <a:pPr marL="171450" indent="-171450">
+              <a:buFont typeface="Arial" panose="020B0604020202020204" pitchFamily="34" charset="0"/>
+              <a:buChar char="•"/>
+            </a:pPr>
+            <a:r>
+              <a:rPr lang="en-US" dirty="0"/>
+              <a:t>Augmentation of dataset, </a:t>
+            </a:r>
+            <a:r>
+              <a:rPr lang="en-US" sz="1200" b="0" i="0" dirty="0">
+                <a:effectLst/>
+                <a:latin typeface="+mj-lt"/>
+                <a:ea typeface="+mj-ea"/>
+                <a:cs typeface="+mj-cs"/>
+                <a:sym typeface="Calibri"/>
+              </a:rPr>
+              <a:t>rotation on the cartoon images, one might also achieve better results in viewpoint and illumination</a:t>
+            </a:r>
+          </a:p>
+          <a:p>
+            <a:pPr marL="171450" indent="-171450">
+              <a:buFont typeface="Arial" panose="020B0604020202020204" pitchFamily="34" charset="0"/>
+              <a:buChar char="•"/>
+            </a:pPr>
+            <a:r>
+              <a:rPr lang="en-US" dirty="0"/>
+              <a:t>Extend conditional architecture such that the skin </a:t>
+            </a:r>
+            <a:r>
+              <a:rPr lang="en-US" dirty="0" err="1"/>
+              <a:t>colour</a:t>
+            </a:r>
+            <a:r>
+              <a:rPr lang="en-US" dirty="0"/>
+              <a:t> is also considered</a:t>
+            </a:r>
+          </a:p>
+        </p:txBody>
+      </p:sp>
+    </p:spTree>
+    <p:extLst>
+      <p:ext uri="{BB962C8B-B14F-4D97-AF65-F5344CB8AC3E}">
+        <p14:creationId xmlns:p14="http://schemas.microsoft.com/office/powerpoint/2010/main" val="449851877"/>
+      </p:ext>
+    </p:extLst>
+  </p:cSld>
+  <p:clrMapOvr>
+    <a:masterClrMapping/>
+  </p:clrMapOvr>
+</p:notes>
+</file>
+
 <file path=ppt/slideLayouts/slideLayout1.xml><?xml version="1.0" encoding="utf-8"?>
-<p:sldLayout xmlns:a="http://schemas.openxmlformats.org/drawingml/2006/main" xmlns:r="http://schemas.openxmlformats.org/officeDocument/2006/relationships" xmlns:p="http://schemas.openxmlformats.org/presentationml/2006/main" type="title" showMasterSp="1" showMasterPhAnim="1">
+<p:sldLayout xmlns:a="http://schemas.openxmlformats.org/drawingml/2006/main" xmlns:r="http://schemas.openxmlformats.org/officeDocument/2006/relationships" xmlns:p="http://schemas.openxmlformats.org/presentationml/2006/main" type="title">
   <p:cSld name="Title Slide">
     <p:spTree>
       <p:nvGrpSpPr>
@@ -492,7 +736,9 @@
       <p:sp>
         <p:nvSpPr>
           <p:cNvPr id="11" name="Shape 11"/>
-          <p:cNvSpPr/>
+          <p:cNvSpPr>
+            <a:spLocks noGrp="1"/>
+          </p:cNvSpPr>
           <p:nvPr>
             <p:ph type="title"/>
           </p:nvPr>
@@ -514,7 +760,6 @@
             </a:lvl1pPr>
           </a:lstStyle>
           <a:p>
-            <a:pPr/>
             <a:r>
               <a:t>Click to edit Master title style</a:t>
             </a:r>
@@ -524,7 +769,9 @@
       <p:sp>
         <p:nvSpPr>
           <p:cNvPr id="12" name="Shape 12"/>
-          <p:cNvSpPr/>
+          <p:cNvSpPr>
+            <a:spLocks noGrp="1"/>
+          </p:cNvSpPr>
           <p:nvPr>
             <p:ph type="body" sz="quarter" idx="1"/>
           </p:nvPr>
@@ -549,7 +796,6 @@
             </a:lvl1pPr>
           </a:lstStyle>
           <a:p>
-            <a:pPr/>
             <a:r>
               <a:t>Click to edit Master subtitle style</a:t>
             </a:r>
@@ -559,7 +805,9 @@
       <p:sp>
         <p:nvSpPr>
           <p:cNvPr id="13" name="Shape 13"/>
-          <p:cNvSpPr/>
+          <p:cNvSpPr>
+            <a:spLocks noGrp="1"/>
+          </p:cNvSpPr>
           <p:nvPr>
             <p:ph type="sldNum" sz="quarter" idx="2"/>
           </p:nvPr>
@@ -573,8 +821,10 @@
           <a:bodyPr/>
           <a:lstStyle/>
           <a:p>
-            <a:pPr/>
-            <a:fld id="{86CB4B4D-7CA3-9044-876B-883B54F8677D}" type="slidenum"/>
+            <a:fld id="{86CB4B4D-7CA3-9044-876B-883B54F8677D}" type="slidenum">
+              <a:t>‹#›</a:t>
+            </a:fld>
+            <a:endParaRPr/>
           </a:p>
         </p:txBody>
       </p:sp>
@@ -583,12 +833,12 @@
   <p:clrMapOvr>
     <a:masterClrMapping/>
   </p:clrMapOvr>
-  <p:transition xmlns:p14="http://schemas.microsoft.com/office/powerpoint/2010/main" spd="med" advClick="1"/>
+  <p:transition spd="med"/>
 </p:sldLayout>
 </file>
 
 <file path=ppt/slideLayouts/slideLayout10.xml><?xml version="1.0" encoding="utf-8"?>
-<p:sldLayout xmlns:a="http://schemas.openxmlformats.org/drawingml/2006/main" xmlns:r="http://schemas.openxmlformats.org/officeDocument/2006/relationships" xmlns:p="http://schemas.openxmlformats.org/presentationml/2006/main" type="tx" showMasterSp="1" showMasterPhAnim="1">
+<p:sldLayout xmlns:a="http://schemas.openxmlformats.org/drawingml/2006/main" xmlns:r="http://schemas.openxmlformats.org/officeDocument/2006/relationships" xmlns:p="http://schemas.openxmlformats.org/presentationml/2006/main" type="tx">
   <p:cSld name="Title and Vertical Text">
     <p:spTree>
       <p:nvGrpSpPr>
@@ -607,7 +857,9 @@
       <p:sp>
         <p:nvSpPr>
           <p:cNvPr id="92" name="Shape 92"/>
-          <p:cNvSpPr/>
+          <p:cNvSpPr>
+            <a:spLocks noGrp="1"/>
+          </p:cNvSpPr>
           <p:nvPr>
             <p:ph type="title"/>
           </p:nvPr>
@@ -621,7 +873,6 @@
           <a:bodyPr/>
           <a:lstStyle/>
           <a:p>
-            <a:pPr/>
             <a:r>
               <a:t>Click to edit Master title style</a:t>
             </a:r>
@@ -631,7 +882,9 @@
       <p:sp>
         <p:nvSpPr>
           <p:cNvPr id="93" name="Shape 93"/>
-          <p:cNvSpPr/>
+          <p:cNvSpPr>
+            <a:spLocks noGrp="1"/>
+          </p:cNvSpPr>
           <p:nvPr>
             <p:ph type="body" idx="1"/>
           </p:nvPr>
@@ -645,7 +898,6 @@
           <a:bodyPr/>
           <a:lstStyle/>
           <a:p>
-            <a:pPr/>
             <a:r>
               <a:t>Edit Master text styles</a:t>
             </a:r>
@@ -679,7 +931,9 @@
       <p:sp>
         <p:nvSpPr>
           <p:cNvPr id="94" name="Shape 94"/>
-          <p:cNvSpPr/>
+          <p:cNvSpPr>
+            <a:spLocks noGrp="1"/>
+          </p:cNvSpPr>
           <p:nvPr>
             <p:ph type="sldNum" sz="quarter" idx="2"/>
           </p:nvPr>
@@ -693,8 +947,10 @@
           <a:bodyPr/>
           <a:lstStyle/>
           <a:p>
-            <a:pPr/>
-            <a:fld id="{86CB4B4D-7CA3-9044-876B-883B54F8677D}" type="slidenum"/>
+            <a:fld id="{86CB4B4D-7CA3-9044-876B-883B54F8677D}" type="slidenum">
+              <a:t>‹#›</a:t>
+            </a:fld>
+            <a:endParaRPr/>
           </a:p>
         </p:txBody>
       </p:sp>
@@ -703,12 +959,12 @@
   <p:clrMapOvr>
     <a:masterClrMapping/>
   </p:clrMapOvr>
-  <p:transition xmlns:p14="http://schemas.microsoft.com/office/powerpoint/2010/main" spd="med" advClick="1"/>
+  <p:transition spd="med"/>
 </p:sldLayout>
 </file>
 
 <file path=ppt/slideLayouts/slideLayout11.xml><?xml version="1.0" encoding="utf-8"?>
-<p:sldLayout xmlns:a="http://schemas.openxmlformats.org/drawingml/2006/main" xmlns:r="http://schemas.openxmlformats.org/officeDocument/2006/relationships" xmlns:p="http://schemas.openxmlformats.org/presentationml/2006/main" type="tx" showMasterSp="1" showMasterPhAnim="1">
+<p:sldLayout xmlns:a="http://schemas.openxmlformats.org/drawingml/2006/main" xmlns:r="http://schemas.openxmlformats.org/officeDocument/2006/relationships" xmlns:p="http://schemas.openxmlformats.org/presentationml/2006/main" type="tx">
   <p:cSld name="Vertical Title and Text">
     <p:spTree>
       <p:nvGrpSpPr>
@@ -727,7 +983,9 @@
       <p:sp>
         <p:nvSpPr>
           <p:cNvPr id="101" name="Shape 101"/>
-          <p:cNvSpPr/>
+          <p:cNvSpPr>
+            <a:spLocks noGrp="1"/>
+          </p:cNvSpPr>
           <p:nvPr>
             <p:ph type="title"/>
           </p:nvPr>
@@ -745,7 +1003,6 @@
           <a:bodyPr/>
           <a:lstStyle/>
           <a:p>
-            <a:pPr/>
             <a:r>
               <a:t>Click to edit Master title style</a:t>
             </a:r>
@@ -755,7 +1012,9 @@
       <p:sp>
         <p:nvSpPr>
           <p:cNvPr id="102" name="Shape 102"/>
-          <p:cNvSpPr/>
+          <p:cNvSpPr>
+            <a:spLocks noGrp="1"/>
+          </p:cNvSpPr>
           <p:nvPr>
             <p:ph type="body" idx="1"/>
           </p:nvPr>
@@ -773,7 +1032,6 @@
           <a:bodyPr/>
           <a:lstStyle/>
           <a:p>
-            <a:pPr/>
             <a:r>
               <a:t>Edit Master text styles</a:t>
             </a:r>
@@ -807,7 +1065,9 @@
       <p:sp>
         <p:nvSpPr>
           <p:cNvPr id="103" name="Shape 103"/>
-          <p:cNvSpPr/>
+          <p:cNvSpPr>
+            <a:spLocks noGrp="1"/>
+          </p:cNvSpPr>
           <p:nvPr>
             <p:ph type="sldNum" sz="quarter" idx="2"/>
           </p:nvPr>
@@ -821,8 +1081,10 @@
           <a:bodyPr/>
           <a:lstStyle/>
           <a:p>
-            <a:pPr/>
-            <a:fld id="{86CB4B4D-7CA3-9044-876B-883B54F8677D}" type="slidenum"/>
+            <a:fld id="{86CB4B4D-7CA3-9044-876B-883B54F8677D}" type="slidenum">
+              <a:t>‹#›</a:t>
+            </a:fld>
+            <a:endParaRPr/>
           </a:p>
         </p:txBody>
       </p:sp>
@@ -831,12 +1093,12 @@
   <p:clrMapOvr>
     <a:masterClrMapping/>
   </p:clrMapOvr>
-  <p:transition xmlns:p14="http://schemas.microsoft.com/office/powerpoint/2010/main" spd="med" advClick="1"/>
+  <p:transition spd="med"/>
 </p:sldLayout>
 </file>
 
 <file path=ppt/slideLayouts/slideLayout12.xml><?xml version="1.0" encoding="utf-8"?>
-<p:sldLayout xmlns:a="http://schemas.openxmlformats.org/drawingml/2006/main" xmlns:r="http://schemas.openxmlformats.org/officeDocument/2006/relationships" xmlns:p="http://schemas.openxmlformats.org/presentationml/2006/main" type="tx" showMasterSp="1" showMasterPhAnim="1">
+<p:sldLayout xmlns:a="http://schemas.openxmlformats.org/drawingml/2006/main" xmlns:r="http://schemas.openxmlformats.org/officeDocument/2006/relationships" xmlns:p="http://schemas.openxmlformats.org/presentationml/2006/main" type="tx">
   <p:cSld name="Title and Content">
     <p:spTree>
       <p:nvGrpSpPr>
@@ -855,7 +1117,9 @@
       <p:sp>
         <p:nvSpPr>
           <p:cNvPr id="110" name="Shape 110"/>
-          <p:cNvSpPr/>
+          <p:cNvSpPr>
+            <a:spLocks noGrp="1"/>
+          </p:cNvSpPr>
           <p:nvPr>
             <p:ph type="title"/>
           </p:nvPr>
@@ -869,7 +1133,6 @@
           <a:bodyPr/>
           <a:lstStyle/>
           <a:p>
-            <a:pPr/>
             <a:r>
               <a:t>Title Text</a:t>
             </a:r>
@@ -879,7 +1142,9 @@
       <p:sp>
         <p:nvSpPr>
           <p:cNvPr id="111" name="Shape 111"/>
-          <p:cNvSpPr/>
+          <p:cNvSpPr>
+            <a:spLocks noGrp="1"/>
+          </p:cNvSpPr>
           <p:nvPr>
             <p:ph type="body" idx="1"/>
           </p:nvPr>
@@ -893,7 +1158,6 @@
           <a:bodyPr/>
           <a:lstStyle/>
           <a:p>
-            <a:pPr/>
             <a:r>
               <a:t>Body Level One</a:t>
             </a:r>
@@ -927,7 +1191,9 @@
       <p:sp>
         <p:nvSpPr>
           <p:cNvPr id="112" name="Shape 112"/>
-          <p:cNvSpPr/>
+          <p:cNvSpPr>
+            <a:spLocks noGrp="1"/>
+          </p:cNvSpPr>
           <p:nvPr>
             <p:ph type="sldNum" sz="quarter" idx="2"/>
           </p:nvPr>
@@ -941,8 +1207,10 @@
           <a:bodyPr/>
           <a:lstStyle/>
           <a:p>
-            <a:pPr/>
-            <a:fld id="{86CB4B4D-7CA3-9044-876B-883B54F8677D}" type="slidenum"/>
+            <a:fld id="{86CB4B4D-7CA3-9044-876B-883B54F8677D}" type="slidenum">
+              <a:t>‹#›</a:t>
+            </a:fld>
+            <a:endParaRPr/>
           </a:p>
         </p:txBody>
       </p:sp>
@@ -951,12 +1219,12 @@
   <p:clrMapOvr>
     <a:masterClrMapping/>
   </p:clrMapOvr>
-  <p:transition xmlns:p14="http://schemas.microsoft.com/office/powerpoint/2010/main" spd="med" advClick="1"/>
+  <p:transition spd="med"/>
 </p:sldLayout>
 </file>
 
 <file path=ppt/slideLayouts/slideLayout2.xml><?xml version="1.0" encoding="utf-8"?>
-<p:sldLayout xmlns:a="http://schemas.openxmlformats.org/drawingml/2006/main" xmlns:r="http://schemas.openxmlformats.org/officeDocument/2006/relationships" xmlns:p="http://schemas.openxmlformats.org/presentationml/2006/main" type="tx" showMasterSp="1" showMasterPhAnim="1">
+<p:sldLayout xmlns:a="http://schemas.openxmlformats.org/drawingml/2006/main" xmlns:r="http://schemas.openxmlformats.org/officeDocument/2006/relationships" xmlns:p="http://schemas.openxmlformats.org/presentationml/2006/main" type="tx">
   <p:cSld name="Title and Content">
     <p:spTree>
       <p:nvGrpSpPr>
@@ -975,7 +1243,9 @@
       <p:sp>
         <p:nvSpPr>
           <p:cNvPr id="20" name="Shape 20"/>
-          <p:cNvSpPr/>
+          <p:cNvSpPr>
+            <a:spLocks noGrp="1"/>
+          </p:cNvSpPr>
           <p:nvPr>
             <p:ph type="title"/>
           </p:nvPr>
@@ -989,7 +1259,6 @@
           <a:bodyPr/>
           <a:lstStyle/>
           <a:p>
-            <a:pPr/>
             <a:r>
               <a:t>Click to edit Master title style</a:t>
             </a:r>
@@ -999,7 +1268,9 @@
       <p:sp>
         <p:nvSpPr>
           <p:cNvPr id="21" name="Shape 21"/>
-          <p:cNvSpPr/>
+          <p:cNvSpPr>
+            <a:spLocks noGrp="1"/>
+          </p:cNvSpPr>
           <p:nvPr>
             <p:ph type="body" idx="1"/>
           </p:nvPr>
@@ -1013,7 +1284,6 @@
           <a:bodyPr/>
           <a:lstStyle/>
           <a:p>
-            <a:pPr/>
             <a:r>
               <a:t>Edit Master text styles</a:t>
             </a:r>
@@ -1047,7 +1317,9 @@
       <p:sp>
         <p:nvSpPr>
           <p:cNvPr id="22" name="Shape 22"/>
-          <p:cNvSpPr/>
+          <p:cNvSpPr>
+            <a:spLocks noGrp="1"/>
+          </p:cNvSpPr>
           <p:nvPr>
             <p:ph type="sldNum" sz="quarter" idx="2"/>
           </p:nvPr>
@@ -1061,8 +1333,10 @@
           <a:bodyPr/>
           <a:lstStyle/>
           <a:p>
-            <a:pPr/>
-            <a:fld id="{86CB4B4D-7CA3-9044-876B-883B54F8677D}" type="slidenum"/>
+            <a:fld id="{86CB4B4D-7CA3-9044-876B-883B54F8677D}" type="slidenum">
+              <a:t>‹#›</a:t>
+            </a:fld>
+            <a:endParaRPr/>
           </a:p>
         </p:txBody>
       </p:sp>
@@ -1071,12 +1345,12 @@
   <p:clrMapOvr>
     <a:masterClrMapping/>
   </p:clrMapOvr>
-  <p:transition xmlns:p14="http://schemas.microsoft.com/office/powerpoint/2010/main" spd="med" advClick="1"/>
+  <p:transition spd="med"/>
 </p:sldLayout>
 </file>
 
 <file path=ppt/slideLayouts/slideLayout3.xml><?xml version="1.0" encoding="utf-8"?>
-<p:sldLayout xmlns:a="http://schemas.openxmlformats.org/drawingml/2006/main" xmlns:r="http://schemas.openxmlformats.org/officeDocument/2006/relationships" xmlns:p="http://schemas.openxmlformats.org/presentationml/2006/main" type="tx" showMasterSp="1" showMasterPhAnim="1">
+<p:sldLayout xmlns:a="http://schemas.openxmlformats.org/drawingml/2006/main" xmlns:r="http://schemas.openxmlformats.org/officeDocument/2006/relationships" xmlns:p="http://schemas.openxmlformats.org/presentationml/2006/main" type="tx">
   <p:cSld name="Section Header">
     <p:spTree>
       <p:nvGrpSpPr>
@@ -1095,7 +1369,9 @@
       <p:sp>
         <p:nvSpPr>
           <p:cNvPr id="29" name="Shape 29"/>
-          <p:cNvSpPr/>
+          <p:cNvSpPr>
+            <a:spLocks noGrp="1"/>
+          </p:cNvSpPr>
           <p:nvPr>
             <p:ph type="title"/>
           </p:nvPr>
@@ -1117,7 +1393,6 @@
             </a:lvl1pPr>
           </a:lstStyle>
           <a:p>
-            <a:pPr/>
             <a:r>
               <a:t>Click to edit Master title style</a:t>
             </a:r>
@@ -1127,7 +1402,9 @@
       <p:sp>
         <p:nvSpPr>
           <p:cNvPr id="30" name="Shape 30"/>
-          <p:cNvSpPr/>
+          <p:cNvSpPr>
+            <a:spLocks noGrp="1"/>
+          </p:cNvSpPr>
           <p:nvPr>
             <p:ph type="body" sz="quarter" idx="1"/>
           </p:nvPr>
@@ -1156,7 +1433,6 @@
             </a:lvl1pPr>
           </a:lstStyle>
           <a:p>
-            <a:pPr/>
             <a:r>
               <a:t>Edit Master text styles</a:t>
             </a:r>
@@ -1166,7 +1442,9 @@
       <p:sp>
         <p:nvSpPr>
           <p:cNvPr id="31" name="Shape 31"/>
-          <p:cNvSpPr/>
+          <p:cNvSpPr>
+            <a:spLocks noGrp="1"/>
+          </p:cNvSpPr>
           <p:nvPr>
             <p:ph type="sldNum" sz="quarter" idx="2"/>
           </p:nvPr>
@@ -1180,8 +1458,10 @@
           <a:bodyPr/>
           <a:lstStyle/>
           <a:p>
-            <a:pPr/>
-            <a:fld id="{86CB4B4D-7CA3-9044-876B-883B54F8677D}" type="slidenum"/>
+            <a:fld id="{86CB4B4D-7CA3-9044-876B-883B54F8677D}" type="slidenum">
+              <a:t>‹#›</a:t>
+            </a:fld>
+            <a:endParaRPr/>
           </a:p>
         </p:txBody>
       </p:sp>
@@ -1190,12 +1470,12 @@
   <p:clrMapOvr>
     <a:masterClrMapping/>
   </p:clrMapOvr>
-  <p:transition xmlns:p14="http://schemas.microsoft.com/office/powerpoint/2010/main" spd="med" advClick="1"/>
+  <p:transition spd="med"/>
 </p:sldLayout>
 </file>
 
 <file path=ppt/slideLayouts/slideLayout4.xml><?xml version="1.0" encoding="utf-8"?>
-<p:sldLayout xmlns:a="http://schemas.openxmlformats.org/drawingml/2006/main" xmlns:r="http://schemas.openxmlformats.org/officeDocument/2006/relationships" xmlns:p="http://schemas.openxmlformats.org/presentationml/2006/main" type="tx" showMasterSp="1" showMasterPhAnim="1">
+<p:sldLayout xmlns:a="http://schemas.openxmlformats.org/drawingml/2006/main" xmlns:r="http://schemas.openxmlformats.org/officeDocument/2006/relationships" xmlns:p="http://schemas.openxmlformats.org/presentationml/2006/main" type="tx">
   <p:cSld name="Two Content">
     <p:spTree>
       <p:nvGrpSpPr>
@@ -1214,7 +1494,9 @@
       <p:sp>
         <p:nvSpPr>
           <p:cNvPr id="38" name="Shape 38"/>
-          <p:cNvSpPr/>
+          <p:cNvSpPr>
+            <a:spLocks noGrp="1"/>
+          </p:cNvSpPr>
           <p:nvPr>
             <p:ph type="title"/>
           </p:nvPr>
@@ -1228,7 +1510,6 @@
           <a:bodyPr/>
           <a:lstStyle/>
           <a:p>
-            <a:pPr/>
             <a:r>
               <a:t>Click to edit Master title style</a:t>
             </a:r>
@@ -1238,7 +1519,9 @@
       <p:sp>
         <p:nvSpPr>
           <p:cNvPr id="39" name="Shape 39"/>
-          <p:cNvSpPr/>
+          <p:cNvSpPr>
+            <a:spLocks noGrp="1"/>
+          </p:cNvSpPr>
           <p:nvPr>
             <p:ph type="body" sz="half" idx="1"/>
           </p:nvPr>
@@ -1256,7 +1539,6 @@
           <a:bodyPr/>
           <a:lstStyle/>
           <a:p>
-            <a:pPr/>
             <a:r>
               <a:t>Edit Master text styles</a:t>
             </a:r>
@@ -1290,7 +1572,9 @@
       <p:sp>
         <p:nvSpPr>
           <p:cNvPr id="40" name="Shape 40"/>
-          <p:cNvSpPr/>
+          <p:cNvSpPr>
+            <a:spLocks noGrp="1"/>
+          </p:cNvSpPr>
           <p:nvPr>
             <p:ph type="sldNum" sz="quarter" idx="2"/>
           </p:nvPr>
@@ -1304,8 +1588,10 @@
           <a:bodyPr/>
           <a:lstStyle/>
           <a:p>
-            <a:pPr/>
-            <a:fld id="{86CB4B4D-7CA3-9044-876B-883B54F8677D}" type="slidenum"/>
+            <a:fld id="{86CB4B4D-7CA3-9044-876B-883B54F8677D}" type="slidenum">
+              <a:t>‹#›</a:t>
+            </a:fld>
+            <a:endParaRPr/>
           </a:p>
         </p:txBody>
       </p:sp>
@@ -1314,12 +1600,12 @@
   <p:clrMapOvr>
     <a:masterClrMapping/>
   </p:clrMapOvr>
-  <p:transition xmlns:p14="http://schemas.microsoft.com/office/powerpoint/2010/main" spd="med" advClick="1"/>
+  <p:transition spd="med"/>
 </p:sldLayout>
 </file>
 
 <file path=ppt/slideLayouts/slideLayout5.xml><?xml version="1.0" encoding="utf-8"?>
-<p:sldLayout xmlns:a="http://schemas.openxmlformats.org/drawingml/2006/main" xmlns:r="http://schemas.openxmlformats.org/officeDocument/2006/relationships" xmlns:p="http://schemas.openxmlformats.org/presentationml/2006/main" type="tx" showMasterSp="1" showMasterPhAnim="1">
+<p:sldLayout xmlns:a="http://schemas.openxmlformats.org/drawingml/2006/main" xmlns:r="http://schemas.openxmlformats.org/officeDocument/2006/relationships" xmlns:p="http://schemas.openxmlformats.org/presentationml/2006/main" type="tx">
   <p:cSld name="Comparison">
     <p:spTree>
       <p:nvGrpSpPr>
@@ -1338,7 +1624,9 @@
       <p:sp>
         <p:nvSpPr>
           <p:cNvPr id="47" name="Shape 47"/>
-          <p:cNvSpPr/>
+          <p:cNvSpPr>
+            <a:spLocks noGrp="1"/>
+          </p:cNvSpPr>
           <p:nvPr>
             <p:ph type="title"/>
           </p:nvPr>
@@ -1356,7 +1644,6 @@
           <a:bodyPr/>
           <a:lstStyle/>
           <a:p>
-            <a:pPr/>
             <a:r>
               <a:t>Click to edit Master title style</a:t>
             </a:r>
@@ -1366,7 +1653,9 @@
       <p:sp>
         <p:nvSpPr>
           <p:cNvPr id="48" name="Shape 48"/>
-          <p:cNvSpPr/>
+          <p:cNvSpPr>
+            <a:spLocks noGrp="1"/>
+          </p:cNvSpPr>
           <p:nvPr>
             <p:ph type="body" sz="quarter" idx="1"/>
           </p:nvPr>
@@ -1387,11 +1676,10 @@
               <a:buSzTx/>
               <a:buFontTx/>
               <a:buNone/>
-              <a:defRPr b="1" sz="2400"/>
+              <a:defRPr sz="2400" b="1"/>
             </a:lvl1pPr>
           </a:lstStyle>
           <a:p>
-            <a:pPr/>
             <a:r>
               <a:t>Edit Master text styles</a:t>
             </a:r>
@@ -1401,7 +1689,9 @@
       <p:sp>
         <p:nvSpPr>
           <p:cNvPr id="49" name="Shape 49"/>
-          <p:cNvSpPr/>
+          <p:cNvSpPr>
+            <a:spLocks noGrp="1"/>
+          </p:cNvSpPr>
           <p:nvPr>
             <p:ph type="body" sz="quarter" idx="13"/>
           </p:nvPr>
@@ -1423,15 +1713,18 @@
               <a:buSzTx/>
               <a:buFontTx/>
               <a:buNone/>
-              <a:defRPr b="1" sz="2400"/>
+              <a:defRPr sz="2400" b="1"/>
             </a:pPr>
+            <a:endParaRPr/>
           </a:p>
         </p:txBody>
       </p:sp>
       <p:sp>
         <p:nvSpPr>
           <p:cNvPr id="50" name="Shape 50"/>
-          <p:cNvSpPr/>
+          <p:cNvSpPr>
+            <a:spLocks noGrp="1"/>
+          </p:cNvSpPr>
           <p:nvPr>
             <p:ph type="sldNum" sz="quarter" idx="2"/>
           </p:nvPr>
@@ -1445,8 +1738,10 @@
           <a:bodyPr/>
           <a:lstStyle/>
           <a:p>
-            <a:pPr/>
-            <a:fld id="{86CB4B4D-7CA3-9044-876B-883B54F8677D}" type="slidenum"/>
+            <a:fld id="{86CB4B4D-7CA3-9044-876B-883B54F8677D}" type="slidenum">
+              <a:t>‹#›</a:t>
+            </a:fld>
+            <a:endParaRPr/>
           </a:p>
         </p:txBody>
       </p:sp>
@@ -1455,12 +1750,12 @@
   <p:clrMapOvr>
     <a:masterClrMapping/>
   </p:clrMapOvr>
-  <p:transition xmlns:p14="http://schemas.microsoft.com/office/powerpoint/2010/main" spd="med" advClick="1"/>
+  <p:transition spd="med"/>
 </p:sldLayout>
 </file>
 
 <file path=ppt/slideLayouts/slideLayout6.xml><?xml version="1.0" encoding="utf-8"?>
-<p:sldLayout xmlns:a="http://schemas.openxmlformats.org/drawingml/2006/main" xmlns:r="http://schemas.openxmlformats.org/officeDocument/2006/relationships" xmlns:p="http://schemas.openxmlformats.org/presentationml/2006/main" type="tx" showMasterSp="1" showMasterPhAnim="1">
+<p:sldLayout xmlns:a="http://schemas.openxmlformats.org/drawingml/2006/main" xmlns:r="http://schemas.openxmlformats.org/officeDocument/2006/relationships" xmlns:p="http://schemas.openxmlformats.org/presentationml/2006/main" type="tx">
   <p:cSld name="Title Only">
     <p:spTree>
       <p:nvGrpSpPr>
@@ -1479,7 +1774,9 @@
       <p:sp>
         <p:nvSpPr>
           <p:cNvPr id="57" name="Shape 57"/>
-          <p:cNvSpPr/>
+          <p:cNvSpPr>
+            <a:spLocks noGrp="1"/>
+          </p:cNvSpPr>
           <p:nvPr>
             <p:ph type="title"/>
           </p:nvPr>
@@ -1493,7 +1790,6 @@
           <a:bodyPr/>
           <a:lstStyle/>
           <a:p>
-            <a:pPr/>
             <a:r>
               <a:t>Click to edit Master title style</a:t>
             </a:r>
@@ -1503,7 +1799,9 @@
       <p:sp>
         <p:nvSpPr>
           <p:cNvPr id="58" name="Shape 58"/>
-          <p:cNvSpPr/>
+          <p:cNvSpPr>
+            <a:spLocks noGrp="1"/>
+          </p:cNvSpPr>
           <p:nvPr>
             <p:ph type="sldNum" sz="quarter" idx="2"/>
           </p:nvPr>
@@ -1517,8 +1815,10 @@
           <a:bodyPr/>
           <a:lstStyle/>
           <a:p>
-            <a:pPr/>
-            <a:fld id="{86CB4B4D-7CA3-9044-876B-883B54F8677D}" type="slidenum"/>
+            <a:fld id="{86CB4B4D-7CA3-9044-876B-883B54F8677D}" type="slidenum">
+              <a:t>‹#›</a:t>
+            </a:fld>
+            <a:endParaRPr/>
           </a:p>
         </p:txBody>
       </p:sp>
@@ -1527,12 +1827,12 @@
   <p:clrMapOvr>
     <a:masterClrMapping/>
   </p:clrMapOvr>
-  <p:transition xmlns:p14="http://schemas.microsoft.com/office/powerpoint/2010/main" spd="med" advClick="1"/>
+  <p:transition spd="med"/>
 </p:sldLayout>
 </file>
 
 <file path=ppt/slideLayouts/slideLayout7.xml><?xml version="1.0" encoding="utf-8"?>
-<p:sldLayout xmlns:a="http://schemas.openxmlformats.org/drawingml/2006/main" xmlns:r="http://schemas.openxmlformats.org/officeDocument/2006/relationships" xmlns:p="http://schemas.openxmlformats.org/presentationml/2006/main" type="tx" showMasterSp="1" showMasterPhAnim="1">
+<p:sldLayout xmlns:a="http://schemas.openxmlformats.org/drawingml/2006/main" xmlns:r="http://schemas.openxmlformats.org/officeDocument/2006/relationships" xmlns:p="http://schemas.openxmlformats.org/presentationml/2006/main" type="tx">
   <p:cSld name="Blank">
     <p:spTree>
       <p:nvGrpSpPr>
@@ -1551,7 +1851,9 @@
       <p:sp>
         <p:nvSpPr>
           <p:cNvPr id="65" name="Shape 65"/>
-          <p:cNvSpPr/>
+          <p:cNvSpPr>
+            <a:spLocks noGrp="1"/>
+          </p:cNvSpPr>
           <p:nvPr>
             <p:ph type="sldNum" sz="quarter" idx="2"/>
           </p:nvPr>
@@ -1565,8 +1867,10 @@
           <a:bodyPr/>
           <a:lstStyle/>
           <a:p>
-            <a:pPr/>
-            <a:fld id="{86CB4B4D-7CA3-9044-876B-883B54F8677D}" type="slidenum"/>
+            <a:fld id="{86CB4B4D-7CA3-9044-876B-883B54F8677D}" type="slidenum">
+              <a:t>‹#›</a:t>
+            </a:fld>
+            <a:endParaRPr/>
           </a:p>
         </p:txBody>
       </p:sp>
@@ -1575,12 +1879,12 @@
   <p:clrMapOvr>
     <a:masterClrMapping/>
   </p:clrMapOvr>
-  <p:transition xmlns:p14="http://schemas.microsoft.com/office/powerpoint/2010/main" spd="med" advClick="1"/>
+  <p:transition spd="med"/>
 </p:sldLayout>
 </file>
 
 <file path=ppt/slideLayouts/slideLayout8.xml><?xml version="1.0" encoding="utf-8"?>
-<p:sldLayout xmlns:a="http://schemas.openxmlformats.org/drawingml/2006/main" xmlns:r="http://schemas.openxmlformats.org/officeDocument/2006/relationships" xmlns:p="http://schemas.openxmlformats.org/presentationml/2006/main" type="tx" showMasterSp="1" showMasterPhAnim="1">
+<p:sldLayout xmlns:a="http://schemas.openxmlformats.org/drawingml/2006/main" xmlns:r="http://schemas.openxmlformats.org/officeDocument/2006/relationships" xmlns:p="http://schemas.openxmlformats.org/presentationml/2006/main" type="tx">
   <p:cSld name="Content with Caption">
     <p:spTree>
       <p:nvGrpSpPr>
@@ -1599,7 +1903,9 @@
       <p:sp>
         <p:nvSpPr>
           <p:cNvPr id="72" name="Shape 72"/>
-          <p:cNvSpPr/>
+          <p:cNvSpPr>
+            <a:spLocks noGrp="1"/>
+          </p:cNvSpPr>
           <p:nvPr>
             <p:ph type="title"/>
           </p:nvPr>
@@ -1621,7 +1927,6 @@
             </a:lvl1pPr>
           </a:lstStyle>
           <a:p>
-            <a:pPr/>
             <a:r>
               <a:t>Click to edit Master title style</a:t>
             </a:r>
@@ -1631,7 +1936,9 @@
       <p:sp>
         <p:nvSpPr>
           <p:cNvPr id="73" name="Shape 73"/>
-          <p:cNvSpPr/>
+          <p:cNvSpPr>
+            <a:spLocks noGrp="1"/>
+          </p:cNvSpPr>
           <p:nvPr>
             <p:ph type="body" sz="half" idx="1"/>
           </p:nvPr>
@@ -1665,7 +1972,6 @@
             </a:lvl5pPr>
           </a:lstStyle>
           <a:p>
-            <a:pPr/>
             <a:r>
               <a:t>Edit Master text styles</a:t>
             </a:r>
@@ -1699,7 +2005,9 @@
       <p:sp>
         <p:nvSpPr>
           <p:cNvPr id="74" name="Shape 74"/>
-          <p:cNvSpPr/>
+          <p:cNvSpPr>
+            <a:spLocks noGrp="1"/>
+          </p:cNvSpPr>
           <p:nvPr>
             <p:ph type="body" sz="quarter" idx="13"/>
           </p:nvPr>
@@ -1723,13 +2031,16 @@
               <a:buNone/>
               <a:defRPr sz="1600"/>
             </a:pPr>
+            <a:endParaRPr/>
           </a:p>
         </p:txBody>
       </p:sp>
       <p:sp>
         <p:nvSpPr>
           <p:cNvPr id="75" name="Shape 75"/>
-          <p:cNvSpPr/>
+          <p:cNvSpPr>
+            <a:spLocks noGrp="1"/>
+          </p:cNvSpPr>
           <p:nvPr>
             <p:ph type="sldNum" sz="quarter" idx="2"/>
           </p:nvPr>
@@ -1743,8 +2054,10 @@
           <a:bodyPr/>
           <a:lstStyle/>
           <a:p>
-            <a:pPr/>
-            <a:fld id="{86CB4B4D-7CA3-9044-876B-883B54F8677D}" type="slidenum"/>
+            <a:fld id="{86CB4B4D-7CA3-9044-876B-883B54F8677D}" type="slidenum">
+              <a:t>‹#›</a:t>
+            </a:fld>
+            <a:endParaRPr/>
           </a:p>
         </p:txBody>
       </p:sp>
@@ -1753,12 +2066,12 @@
   <p:clrMapOvr>
     <a:masterClrMapping/>
   </p:clrMapOvr>
-  <p:transition xmlns:p14="http://schemas.microsoft.com/office/powerpoint/2010/main" spd="med" advClick="1"/>
+  <p:transition spd="med"/>
 </p:sldLayout>
 </file>
 
 <file path=ppt/slideLayouts/slideLayout9.xml><?xml version="1.0" encoding="utf-8"?>
-<p:sldLayout xmlns:a="http://schemas.openxmlformats.org/drawingml/2006/main" xmlns:r="http://schemas.openxmlformats.org/officeDocument/2006/relationships" xmlns:p="http://schemas.openxmlformats.org/presentationml/2006/main" type="tx" showMasterSp="1" showMasterPhAnim="1">
+<p:sldLayout xmlns:a="http://schemas.openxmlformats.org/drawingml/2006/main" xmlns:r="http://schemas.openxmlformats.org/officeDocument/2006/relationships" xmlns:p="http://schemas.openxmlformats.org/presentationml/2006/main" type="tx">
   <p:cSld name="Picture with Caption">
     <p:spTree>
       <p:nvGrpSpPr>
@@ -1777,7 +2090,9 @@
       <p:sp>
         <p:nvSpPr>
           <p:cNvPr id="82" name="Shape 82"/>
-          <p:cNvSpPr/>
+          <p:cNvSpPr>
+            <a:spLocks noGrp="1"/>
+          </p:cNvSpPr>
           <p:nvPr>
             <p:ph type="title"/>
           </p:nvPr>
@@ -1799,7 +2114,6 @@
             </a:lvl1pPr>
           </a:lstStyle>
           <a:p>
-            <a:pPr/>
             <a:r>
               <a:t>Click to edit Master title style</a:t>
             </a:r>
@@ -1809,7 +2123,9 @@
       <p:sp>
         <p:nvSpPr>
           <p:cNvPr id="83" name="Shape 83"/>
-          <p:cNvSpPr/>
+          <p:cNvSpPr>
+            <a:spLocks noGrp="1"/>
+          </p:cNvSpPr>
           <p:nvPr>
             <p:ph type="pic" sz="half" idx="13"/>
           </p:nvPr>
@@ -1829,14 +2145,16 @@
           </a:bodyPr>
           <a:lstStyle/>
           <a:p>
-            <a:pPr/>
+            <a:endParaRPr/>
           </a:p>
         </p:txBody>
       </p:sp>
       <p:sp>
         <p:nvSpPr>
           <p:cNvPr id="84" name="Shape 84"/>
-          <p:cNvSpPr/>
+          <p:cNvSpPr>
+            <a:spLocks noGrp="1"/>
+          </p:cNvSpPr>
           <p:nvPr>
             <p:ph type="body" sz="quarter" idx="1"/>
           </p:nvPr>
@@ -1861,7 +2179,6 @@
             </a:lvl1pPr>
           </a:lstStyle>
           <a:p>
-            <a:pPr/>
             <a:r>
               <a:t>Edit Master text styles</a:t>
             </a:r>
@@ -1871,7 +2188,9 @@
       <p:sp>
         <p:nvSpPr>
           <p:cNvPr id="85" name="Shape 85"/>
-          <p:cNvSpPr/>
+          <p:cNvSpPr>
+            <a:spLocks noGrp="1"/>
+          </p:cNvSpPr>
           <p:nvPr>
             <p:ph type="sldNum" sz="quarter" idx="2"/>
           </p:nvPr>
@@ -1885,8 +2204,10 @@
           <a:bodyPr/>
           <a:lstStyle/>
           <a:p>
-            <a:pPr/>
-            <a:fld id="{86CB4B4D-7CA3-9044-876B-883B54F8677D}" type="slidenum"/>
+            <a:fld id="{86CB4B4D-7CA3-9044-876B-883B54F8677D}" type="slidenum">
+              <a:t>‹#›</a:t>
+            </a:fld>
+            <a:endParaRPr/>
           </a:p>
         </p:txBody>
       </p:sp>
@@ -1895,7 +2216,7 @@
   <p:clrMapOvr>
     <a:masterClrMapping/>
   </p:clrMapOvr>
-  <p:transition xmlns:p14="http://schemas.microsoft.com/office/powerpoint/2010/main" spd="med" advClick="1"/>
+  <p:transition spd="med"/>
 </p:sldLayout>
 </file>
 
@@ -1907,6 +2228,7 @@
         <a:solidFill>
           <a:srgbClr val="FFFFFF"/>
         </a:solidFill>
+        <a:effectLst/>
       </p:bgPr>
     </p:bg>
     <p:spTree>
@@ -1926,7 +2248,9 @@
       <p:sp>
         <p:nvSpPr>
           <p:cNvPr id="2" name="Shape 2"/>
-          <p:cNvSpPr/>
+          <p:cNvSpPr>
+            <a:spLocks noGrp="1"/>
+          </p:cNvSpPr>
           <p:nvPr>
             <p:ph type="title"/>
           </p:nvPr>
@@ -1944,17 +2268,16 @@
           </a:ln>
           <a:extLst>
             <a:ext uri="{C572A759-6A51-4108-AA02-DFA0A04FC94B}">
-              <ma14:wrappingTextBoxFlag xmlns:ma14="http://schemas.microsoft.com/office/mac/drawingml/2011/main" val="1"/>
+              <ma14:wrappingTextBoxFlag xmlns:ma14="http://schemas.microsoft.com/office/mac/drawingml/2011/main" xmlns="" val="1"/>
             </a:ext>
           </a:extLst>
         </p:spPr>
         <p:txBody>
           <a:bodyPr lIns="45719" rIns="45719" anchor="ctr">
-            <a:normAutofit fontScale="100000" lnSpcReduction="0"/>
+            <a:normAutofit/>
           </a:bodyPr>
           <a:lstStyle/>
           <a:p>
-            <a:pPr/>
             <a:r>
               <a:t>Click to edit Master title style</a:t>
             </a:r>
@@ -1964,7 +2287,9 @@
       <p:sp>
         <p:nvSpPr>
           <p:cNvPr id="3" name="Shape 3"/>
-          <p:cNvSpPr/>
+          <p:cNvSpPr>
+            <a:spLocks noGrp="1"/>
+          </p:cNvSpPr>
           <p:nvPr>
             <p:ph type="body" idx="1"/>
           </p:nvPr>
@@ -1982,17 +2307,16 @@
           </a:ln>
           <a:extLst>
             <a:ext uri="{C572A759-6A51-4108-AA02-DFA0A04FC94B}">
-              <ma14:wrappingTextBoxFlag xmlns:ma14="http://schemas.microsoft.com/office/mac/drawingml/2011/main" val="1"/>
+              <ma14:wrappingTextBoxFlag xmlns:ma14="http://schemas.microsoft.com/office/mac/drawingml/2011/main" xmlns="" val="1"/>
             </a:ext>
           </a:extLst>
         </p:spPr>
         <p:txBody>
           <a:bodyPr lIns="45719" rIns="45719">
-            <a:normAutofit fontScale="100000" lnSpcReduction="0"/>
+            <a:normAutofit/>
           </a:bodyPr>
           <a:lstStyle/>
           <a:p>
-            <a:pPr/>
             <a:r>
               <a:t>Edit Master text styles</a:t>
             </a:r>
@@ -2026,7 +2350,9 @@
       <p:sp>
         <p:nvSpPr>
           <p:cNvPr id="4" name="Shape 4"/>
-          <p:cNvSpPr/>
+          <p:cNvSpPr>
+            <a:spLocks noGrp="1"/>
+          </p:cNvSpPr>
           <p:nvPr>
             <p:ph type="sldNum" sz="quarter" idx="2"/>
           </p:nvPr>
@@ -2057,8 +2383,10 @@
             </a:lvl1pPr>
           </a:lstStyle>
           <a:p>
-            <a:pPr/>
-            <a:fld id="{86CB4B4D-7CA3-9044-876B-883B54F8677D}" type="slidenum"/>
+            <a:fld id="{86CB4B4D-7CA3-9044-876B-883B54F8677D}" type="slidenum">
+              <a:t>‹#›</a:t>
+            </a:fld>
+            <a:endParaRPr/>
           </a:p>
         </p:txBody>
       </p:sp>
@@ -2066,20 +2394,20 @@
   </p:cSld>
   <p:clrMap bg1="lt1" tx1="dk1" bg2="lt2" tx2="dk2" accent1="accent1" accent2="accent2" accent3="accent3" accent4="accent4" accent5="accent5" accent6="accent6" hlink="hlink" folHlink="folHlink"/>
   <p:sldLayoutIdLst>
-    <p:sldLayoutId id="2147483649" r:id="rId2"/>
-    <p:sldLayoutId id="2147483650" r:id="rId3"/>
-    <p:sldLayoutId id="2147483651" r:id="rId4"/>
-    <p:sldLayoutId id="2147483652" r:id="rId5"/>
-    <p:sldLayoutId id="2147483653" r:id="rId6"/>
-    <p:sldLayoutId id="2147483654" r:id="rId7"/>
-    <p:sldLayoutId id="2147483655" r:id="rId8"/>
-    <p:sldLayoutId id="2147483656" r:id="rId9"/>
-    <p:sldLayoutId id="2147483657" r:id="rId10"/>
-    <p:sldLayoutId id="2147483658" r:id="rId11"/>
-    <p:sldLayoutId id="2147483659" r:id="rId12"/>
-    <p:sldLayoutId id="2147483660" r:id="rId13"/>
+    <p:sldLayoutId id="2147483649" r:id="rId1"/>
+    <p:sldLayoutId id="2147483650" r:id="rId2"/>
+    <p:sldLayoutId id="2147483651" r:id="rId3"/>
+    <p:sldLayoutId id="2147483652" r:id="rId4"/>
+    <p:sldLayoutId id="2147483653" r:id="rId5"/>
+    <p:sldLayoutId id="2147483654" r:id="rId6"/>
+    <p:sldLayoutId id="2147483655" r:id="rId7"/>
+    <p:sldLayoutId id="2147483656" r:id="rId8"/>
+    <p:sldLayoutId id="2147483657" r:id="rId9"/>
+    <p:sldLayoutId id="2147483658" r:id="rId10"/>
+    <p:sldLayoutId id="2147483659" r:id="rId11"/>
+    <p:sldLayoutId id="2147483660" r:id="rId12"/>
   </p:sldLayoutIdLst>
-  <p:transition xmlns:p14="http://schemas.microsoft.com/office/powerpoint/2010/main" spd="med" advClick="1"/>
+  <p:transition spd="med"/>
   <p:txStyles>
     <p:titleStyle>
       <a:lvl1pPr marL="0" marR="0" indent="0" algn="l" defTabSz="914400" rtl="0" latinLnBrk="0">
@@ -2097,7 +2425,7 @@
         <a:buFontTx/>
         <a:buNone/>
         <a:tabLst/>
-        <a:defRPr b="0" baseline="0" cap="none" i="0" spc="0" strike="noStrike" sz="4400" u="none">
+        <a:defRPr sz="4400" b="0" i="0" u="none" strike="noStrike" cap="none" spc="0" baseline="0">
           <a:ln>
             <a:noFill/>
           </a:ln>
@@ -2126,7 +2454,7 @@
         <a:buFontTx/>
         <a:buNone/>
         <a:tabLst/>
-        <a:defRPr b="0" baseline="0" cap="none" i="0" spc="0" strike="noStrike" sz="4400" u="none">
+        <a:defRPr sz="4400" b="0" i="0" u="none" strike="noStrike" cap="none" spc="0" baseline="0">
           <a:ln>
             <a:noFill/>
           </a:ln>
@@ -2155,7 +2483,7 @@
         <a:buFontTx/>
         <a:buNone/>
         <a:tabLst/>
-        <a:defRPr b="0" baseline="0" cap="none" i="0" spc="0" strike="noStrike" sz="4400" u="none">
+        <a:defRPr sz="4400" b="0" i="0" u="none" strike="noStrike" cap="none" spc="0" baseline="0">
           <a:ln>
             <a:noFill/>
           </a:ln>
@@ -2184,7 +2512,7 @@
         <a:buFontTx/>
         <a:buNone/>
         <a:tabLst/>
-        <a:defRPr b="0" baseline="0" cap="none" i="0" spc="0" strike="noStrike" sz="4400" u="none">
+        <a:defRPr sz="4400" b="0" i="0" u="none" strike="noStrike" cap="none" spc="0" baseline="0">
           <a:ln>
             <a:noFill/>
           </a:ln>
@@ -2213,7 +2541,7 @@
         <a:buFontTx/>
         <a:buNone/>
         <a:tabLst/>
-        <a:defRPr b="0" baseline="0" cap="none" i="0" spc="0" strike="noStrike" sz="4400" u="none">
+        <a:defRPr sz="4400" b="0" i="0" u="none" strike="noStrike" cap="none" spc="0" baseline="0">
           <a:ln>
             <a:noFill/>
           </a:ln>
@@ -2242,7 +2570,7 @@
         <a:buFontTx/>
         <a:buNone/>
         <a:tabLst/>
-        <a:defRPr b="0" baseline="0" cap="none" i="0" spc="0" strike="noStrike" sz="4400" u="none">
+        <a:defRPr sz="4400" b="0" i="0" u="none" strike="noStrike" cap="none" spc="0" baseline="0">
           <a:ln>
             <a:noFill/>
           </a:ln>
@@ -2271,7 +2599,7 @@
         <a:buFontTx/>
         <a:buNone/>
         <a:tabLst/>
-        <a:defRPr b="0" baseline="0" cap="none" i="0" spc="0" strike="noStrike" sz="4400" u="none">
+        <a:defRPr sz="4400" b="0" i="0" u="none" strike="noStrike" cap="none" spc="0" baseline="0">
           <a:ln>
             <a:noFill/>
           </a:ln>
@@ -2300,7 +2628,7 @@
         <a:buFontTx/>
         <a:buNone/>
         <a:tabLst/>
-        <a:defRPr b="0" baseline="0" cap="none" i="0" spc="0" strike="noStrike" sz="4400" u="none">
+        <a:defRPr sz="4400" b="0" i="0" u="none" strike="noStrike" cap="none" spc="0" baseline="0">
           <a:ln>
             <a:noFill/>
           </a:ln>
@@ -2329,7 +2657,7 @@
         <a:buFontTx/>
         <a:buNone/>
         <a:tabLst/>
-        <a:defRPr b="0" baseline="0" cap="none" i="0" spc="0" strike="noStrike" sz="4400" u="none">
+        <a:defRPr sz="4400" b="0" i="0" u="none" strike="noStrike" cap="none" spc="0" baseline="0">
           <a:ln>
             <a:noFill/>
           </a:ln>
@@ -2360,7 +2688,7 @@
         <a:buFont typeface="Arial"/>
         <a:buChar char="•"/>
         <a:tabLst/>
-        <a:defRPr b="0" baseline="0" cap="none" i="0" spc="0" strike="noStrike" sz="2800" u="none">
+        <a:defRPr sz="2800" b="0" i="0" u="none" strike="noStrike" cap="none" spc="0" baseline="0">
           <a:ln>
             <a:noFill/>
           </a:ln>
@@ -2389,7 +2717,7 @@
         <a:buFont typeface="Arial"/>
         <a:buChar char="•"/>
         <a:tabLst/>
-        <a:defRPr b="0" baseline="0" cap="none" i="0" spc="0" strike="noStrike" sz="2800" u="none">
+        <a:defRPr sz="2800" b="0" i="0" u="none" strike="noStrike" cap="none" spc="0" baseline="0">
           <a:ln>
             <a:noFill/>
           </a:ln>
@@ -2418,7 +2746,7 @@
         <a:buFont typeface="Arial"/>
         <a:buChar char="•"/>
         <a:tabLst/>
-        <a:defRPr b="0" baseline="0" cap="none" i="0" spc="0" strike="noStrike" sz="2800" u="none">
+        <a:defRPr sz="2800" b="0" i="0" u="none" strike="noStrike" cap="none" spc="0" baseline="0">
           <a:ln>
             <a:noFill/>
           </a:ln>
@@ -2447,7 +2775,7 @@
         <a:buFont typeface="Arial"/>
         <a:buChar char="•"/>
         <a:tabLst/>
-        <a:defRPr b="0" baseline="0" cap="none" i="0" spc="0" strike="noStrike" sz="2800" u="none">
+        <a:defRPr sz="2800" b="0" i="0" u="none" strike="noStrike" cap="none" spc="0" baseline="0">
           <a:ln>
             <a:noFill/>
           </a:ln>
@@ -2476,7 +2804,7 @@
         <a:buFont typeface="Arial"/>
         <a:buChar char="•"/>
         <a:tabLst/>
-        <a:defRPr b="0" baseline="0" cap="none" i="0" spc="0" strike="noStrike" sz="2800" u="none">
+        <a:defRPr sz="2800" b="0" i="0" u="none" strike="noStrike" cap="none" spc="0" baseline="0">
           <a:ln>
             <a:noFill/>
           </a:ln>
@@ -2505,7 +2833,7 @@
         <a:buFont typeface="Arial"/>
         <a:buChar char="•"/>
         <a:tabLst/>
-        <a:defRPr b="0" baseline="0" cap="none" i="0" spc="0" strike="noStrike" sz="2800" u="none">
+        <a:defRPr sz="2800" b="0" i="0" u="none" strike="noStrike" cap="none" spc="0" baseline="0">
           <a:ln>
             <a:noFill/>
           </a:ln>
@@ -2534,7 +2862,7 @@
         <a:buFont typeface="Arial"/>
         <a:buChar char="•"/>
         <a:tabLst/>
-        <a:defRPr b="0" baseline="0" cap="none" i="0" spc="0" strike="noStrike" sz="2800" u="none">
+        <a:defRPr sz="2800" b="0" i="0" u="none" strike="noStrike" cap="none" spc="0" baseline="0">
           <a:ln>
             <a:noFill/>
           </a:ln>
@@ -2563,7 +2891,7 @@
         <a:buFont typeface="Arial"/>
         <a:buChar char="•"/>
         <a:tabLst/>
-        <a:defRPr b="0" baseline="0" cap="none" i="0" spc="0" strike="noStrike" sz="2800" u="none">
+        <a:defRPr sz="2800" b="0" i="0" u="none" strike="noStrike" cap="none" spc="0" baseline="0">
           <a:ln>
             <a:noFill/>
           </a:ln>
@@ -2592,7 +2920,7 @@
         <a:buFont typeface="Arial"/>
         <a:buChar char="•"/>
         <a:tabLst/>
-        <a:defRPr b="0" baseline="0" cap="none" i="0" spc="0" strike="noStrike" sz="2800" u="none">
+        <a:defRPr sz="2800" b="0" i="0" u="none" strike="noStrike" cap="none" spc="0" baseline="0">
           <a:ln>
             <a:noFill/>
           </a:ln>
@@ -2623,7 +2951,7 @@
         <a:buFontTx/>
         <a:buNone/>
         <a:tabLst/>
-        <a:defRPr b="0" baseline="0" cap="none" i="0" spc="0" strike="noStrike" sz="1200" u="none">
+        <a:defRPr sz="1200" b="0" i="0" u="none" strike="noStrike" cap="none" spc="0" baseline="0">
           <a:ln>
             <a:noFill/>
           </a:ln>
@@ -2652,7 +2980,7 @@
         <a:buFontTx/>
         <a:buNone/>
         <a:tabLst/>
-        <a:defRPr b="0" baseline="0" cap="none" i="0" spc="0" strike="noStrike" sz="1200" u="none">
+        <a:defRPr sz="1200" b="0" i="0" u="none" strike="noStrike" cap="none" spc="0" baseline="0">
           <a:ln>
             <a:noFill/>
           </a:ln>
@@ -2681,7 +3009,7 @@
         <a:buFontTx/>
         <a:buNone/>
         <a:tabLst/>
-        <a:defRPr b="0" baseline="0" cap="none" i="0" spc="0" strike="noStrike" sz="1200" u="none">
+        <a:defRPr sz="1200" b="0" i="0" u="none" strike="noStrike" cap="none" spc="0" baseline="0">
           <a:ln>
             <a:noFill/>
           </a:ln>
@@ -2710,7 +3038,7 @@
         <a:buFontTx/>
         <a:buNone/>
         <a:tabLst/>
-        <a:defRPr b="0" baseline="0" cap="none" i="0" spc="0" strike="noStrike" sz="1200" u="none">
+        <a:defRPr sz="1200" b="0" i="0" u="none" strike="noStrike" cap="none" spc="0" baseline="0">
           <a:ln>
             <a:noFill/>
           </a:ln>
@@ -2739,7 +3067,7 @@
         <a:buFontTx/>
         <a:buNone/>
         <a:tabLst/>
-        <a:defRPr b="0" baseline="0" cap="none" i="0" spc="0" strike="noStrike" sz="1200" u="none">
+        <a:defRPr sz="1200" b="0" i="0" u="none" strike="noStrike" cap="none" spc="0" baseline="0">
           <a:ln>
             <a:noFill/>
           </a:ln>
@@ -2768,7 +3096,7 @@
         <a:buFontTx/>
         <a:buNone/>
         <a:tabLst/>
-        <a:defRPr b="0" baseline="0" cap="none" i="0" spc="0" strike="noStrike" sz="1200" u="none">
+        <a:defRPr sz="1200" b="0" i="0" u="none" strike="noStrike" cap="none" spc="0" baseline="0">
           <a:ln>
             <a:noFill/>
           </a:ln>
@@ -2797,7 +3125,7 @@
         <a:buFontTx/>
         <a:buNone/>
         <a:tabLst/>
-        <a:defRPr b="0" baseline="0" cap="none" i="0" spc="0" strike="noStrike" sz="1200" u="none">
+        <a:defRPr sz="1200" b="0" i="0" u="none" strike="noStrike" cap="none" spc="0" baseline="0">
           <a:ln>
             <a:noFill/>
           </a:ln>
@@ -2826,7 +3154,7 @@
         <a:buFontTx/>
         <a:buNone/>
         <a:tabLst/>
-        <a:defRPr b="0" baseline="0" cap="none" i="0" spc="0" strike="noStrike" sz="1200" u="none">
+        <a:defRPr sz="1200" b="0" i="0" u="none" strike="noStrike" cap="none" spc="0" baseline="0">
           <a:ln>
             <a:noFill/>
           </a:ln>
@@ -2855,7 +3183,7 @@
         <a:buFontTx/>
         <a:buNone/>
         <a:tabLst/>
-        <a:defRPr b="0" baseline="0" cap="none" i="0" spc="0" strike="noStrike" sz="1200" u="none">
+        <a:defRPr sz="1200" b="0" i="0" u="none" strike="noStrike" cap="none" spc="0" baseline="0">
           <a:ln>
             <a:noFill/>
           </a:ln>
@@ -2875,7 +3203,7 @@
 </file>
 
 <file path=ppt/slides/slide1.xml><?xml version="1.0" encoding="utf-8"?>
-<p:sld xmlns:a="http://schemas.openxmlformats.org/drawingml/2006/main" xmlns:r="http://schemas.openxmlformats.org/officeDocument/2006/relationships" xmlns:p="http://schemas.openxmlformats.org/presentationml/2006/main" showMasterSp="1" showMasterPhAnim="1">
+<p:sld xmlns:a="http://schemas.openxmlformats.org/drawingml/2006/main" xmlns:r="http://schemas.openxmlformats.org/officeDocument/2006/relationships" xmlns:p="http://schemas.openxmlformats.org/presentationml/2006/main">
   <p:cSld>
     <p:spTree>
       <p:nvGrpSpPr>
@@ -2894,7 +3222,9 @@
       <p:sp>
         <p:nvSpPr>
           <p:cNvPr id="121" name="Shape 121"/>
-          <p:cNvSpPr/>
+          <p:cNvSpPr>
+            <a:spLocks noGrp="1"/>
+          </p:cNvSpPr>
           <p:nvPr>
             <p:ph type="ctrTitle"/>
           </p:nvPr>
@@ -2916,7 +3246,6 @@
             </a:lvl1pPr>
           </a:lstStyle>
           <a:p>
-            <a:pPr/>
             <a:r>
               <a:t>Face to Cartoon using cycleGAN</a:t>
             </a:r>
@@ -2926,7 +3255,9 @@
       <p:sp>
         <p:nvSpPr>
           <p:cNvPr id="122" name="Shape 122"/>
-          <p:cNvSpPr/>
+          <p:cNvSpPr>
+            <a:spLocks noGrp="1"/>
+          </p:cNvSpPr>
           <p:nvPr>
             <p:ph type="subTitle" sz="quarter" idx="1"/>
           </p:nvPr>
@@ -2944,10 +3275,9 @@
           <a:bodyPr/>
           <a:lstStyle/>
           <a:p>
-            <a:pPr/>
-          </a:p>
-          <a:p>
-            <a:pPr/>
+            <a:endParaRPr/>
+          </a:p>
+          <a:p>
             <a:r>
               <a:t>G. Zeng, B. Fankhauser, J. Segessenmann, G. Ilango</a:t>
             </a:r>
@@ -3002,7 +3332,7 @@
           </a:ln>
           <a:extLst>
             <a:ext uri="{C572A759-6A51-4108-AA02-DFA0A04FC94B}">
-              <ma14:wrappingTextBoxFlag xmlns:ma14="http://schemas.microsoft.com/office/mac/drawingml/2011/main" val="1"/>
+              <ma14:wrappingTextBoxFlag xmlns:ma14="http://schemas.microsoft.com/office/mac/drawingml/2011/main" xmlns="" val="1"/>
             </a:ext>
           </a:extLst>
         </p:spPr>
@@ -3030,12 +3360,100 @@
   <p:clrMapOvr>
     <a:masterClrMapping/>
   </p:clrMapOvr>
-  <p:transition xmlns:p14="http://schemas.microsoft.com/office/powerpoint/2010/main" spd="med" advClick="1"/>
+  <p:transition spd="med"/>
+</p:sld>
+</file>
+
+<file path=ppt/slides/slide10.xml><?xml version="1.0" encoding="utf-8"?>
+<p:sld xmlns:a="http://schemas.openxmlformats.org/drawingml/2006/main" xmlns:r="http://schemas.openxmlformats.org/officeDocument/2006/relationships" xmlns:p="http://schemas.openxmlformats.org/presentationml/2006/main">
+  <p:cSld>
+    <p:spTree>
+      <p:nvGrpSpPr>
+        <p:cNvPr id="1" name=""/>
+        <p:cNvGrpSpPr/>
+        <p:nvPr/>
+      </p:nvGrpSpPr>
+      <p:grpSpPr>
+        <a:xfrm>
+          <a:off x="0" y="0"/>
+          <a:ext cx="0" cy="0"/>
+          <a:chOff x="0" y="0"/>
+          <a:chExt cx="0" cy="0"/>
+        </a:xfrm>
+      </p:grpSpPr>
+      <p:sp>
+        <p:nvSpPr>
+          <p:cNvPr id="157" name="Shape 157"/>
+          <p:cNvSpPr>
+            <a:spLocks noGrp="1"/>
+          </p:cNvSpPr>
+          <p:nvPr>
+            <p:ph type="title"/>
+          </p:nvPr>
+        </p:nvSpPr>
+        <p:spPr>
+          <a:xfrm>
+            <a:off x="4097654" y="2766217"/>
+            <a:ext cx="3996691" cy="1325564"/>
+          </a:xfrm>
+          <a:prstGeom prst="rect">
+            <a:avLst/>
+          </a:prstGeom>
+        </p:spPr>
+        <p:txBody>
+          <a:bodyPr/>
+          <a:lstStyle>
+            <a:lvl1pPr>
+              <a:defRPr sz="6000"/>
+            </a:lvl1pPr>
+          </a:lstStyle>
+          <a:p>
+            <a:r>
+              <a:t>Questions?</a:t>
+            </a:r>
+          </a:p>
+        </p:txBody>
+      </p:sp>
+      <p:pic>
+        <p:nvPicPr>
+          <p:cNvPr id="158" name="image2.png"/>
+          <p:cNvPicPr>
+            <a:picLocks noChangeAspect="1"/>
+          </p:cNvPicPr>
+          <p:nvPr/>
+        </p:nvPicPr>
+        <p:blipFill>
+          <a:blip r:embed="rId2">
+            <a:extLst/>
+          </a:blip>
+          <a:stretch>
+            <a:fillRect/>
+          </a:stretch>
+        </p:blipFill>
+        <p:spPr>
+          <a:xfrm>
+            <a:off x="10200531" y="521208"/>
+            <a:ext cx="1536177" cy="506698"/>
+          </a:xfrm>
+          <a:prstGeom prst="rect">
+            <a:avLst/>
+          </a:prstGeom>
+          <a:ln w="12700">
+            <a:miter lim="400000"/>
+          </a:ln>
+        </p:spPr>
+      </p:pic>
+    </p:spTree>
+  </p:cSld>
+  <p:clrMapOvr>
+    <a:masterClrMapping/>
+  </p:clrMapOvr>
+  <p:transition spd="slow"/>
 </p:sld>
 </file>
 
 <file path=ppt/slides/slide2.xml><?xml version="1.0" encoding="utf-8"?>
-<p:sld xmlns:a="http://schemas.openxmlformats.org/drawingml/2006/main" xmlns:r="http://schemas.openxmlformats.org/officeDocument/2006/relationships" xmlns:p="http://schemas.openxmlformats.org/presentationml/2006/main" showMasterSp="1" showMasterPhAnim="1">
+<p:sld xmlns:a="http://schemas.openxmlformats.org/drawingml/2006/main" xmlns:r="http://schemas.openxmlformats.org/officeDocument/2006/relationships" xmlns:p="http://schemas.openxmlformats.org/presentationml/2006/main">
   <p:cSld>
     <p:spTree>
       <p:nvGrpSpPr>
@@ -3054,7 +3472,9 @@
       <p:sp>
         <p:nvSpPr>
           <p:cNvPr id="126" name="Shape 126"/>
-          <p:cNvSpPr/>
+          <p:cNvSpPr>
+            <a:spLocks noGrp="1"/>
+          </p:cNvSpPr>
           <p:nvPr>
             <p:ph type="title"/>
           </p:nvPr>
@@ -3072,7 +3492,6 @@
           <a:bodyPr/>
           <a:lstStyle/>
           <a:p>
-            <a:pPr/>
             <a:r>
               <a:t>Introduction to the Project</a:t>
             </a:r>
@@ -3127,13 +3546,13 @@
           </a:ln>
           <a:extLst>
             <a:ext uri="{C572A759-6A51-4108-AA02-DFA0A04FC94B}">
-              <ma14:wrappingTextBoxFlag xmlns:ma14="http://schemas.microsoft.com/office/mac/drawingml/2011/main" val="1"/>
+              <ma14:wrappingTextBoxFlag xmlns:ma14="http://schemas.microsoft.com/office/mac/drawingml/2011/main" xmlns="" val="1"/>
             </a:ext>
           </a:extLst>
         </p:spPr>
         <p:txBody>
           <a:bodyPr lIns="45719" rIns="45719">
-            <a:normAutofit fontScale="100000" lnSpcReduction="0"/>
+            <a:normAutofit/>
           </a:bodyPr>
           <a:lstStyle/>
           <a:p>
@@ -3177,12 +3596,12 @@
   <p:clrMapOvr>
     <a:masterClrMapping/>
   </p:clrMapOvr>
-  <p:transition xmlns:p14="http://schemas.microsoft.com/office/powerpoint/2010/main" spd="med" advClick="1" p14:dur="1000"/>
+  <p:transition spd="slow"/>
 </p:sld>
 </file>
 
 <file path=ppt/slides/slide3.xml><?xml version="1.0" encoding="utf-8"?>
-<p:sld xmlns:a="http://schemas.openxmlformats.org/drawingml/2006/main" xmlns:r="http://schemas.openxmlformats.org/officeDocument/2006/relationships" xmlns:p="http://schemas.openxmlformats.org/presentationml/2006/main" showMasterSp="1" showMasterPhAnim="1">
+<p:sld xmlns:a="http://schemas.openxmlformats.org/drawingml/2006/main" xmlns:r="http://schemas.openxmlformats.org/officeDocument/2006/relationships" xmlns:p="http://schemas.openxmlformats.org/presentationml/2006/main">
   <p:cSld>
     <p:spTree>
       <p:nvGrpSpPr>
@@ -3201,7 +3620,9 @@
       <p:sp>
         <p:nvSpPr>
           <p:cNvPr id="130" name="Shape 130"/>
-          <p:cNvSpPr/>
+          <p:cNvSpPr>
+            <a:spLocks noGrp="1"/>
+          </p:cNvSpPr>
           <p:nvPr>
             <p:ph type="title"/>
           </p:nvPr>
@@ -3219,7 +3640,6 @@
           <a:bodyPr/>
           <a:lstStyle/>
           <a:p>
-            <a:pPr/>
             <a:r>
               <a:t>Introduction to cycleGAN</a:t>
             </a:r>
@@ -3229,7 +3649,9 @@
       <p:sp>
         <p:nvSpPr>
           <p:cNvPr id="131" name="Shape 131"/>
-          <p:cNvSpPr/>
+          <p:cNvSpPr>
+            <a:spLocks noGrp="1"/>
+          </p:cNvSpPr>
           <p:nvPr>
             <p:ph type="body" idx="1"/>
           </p:nvPr>
@@ -3247,7 +3669,6 @@
           <a:bodyPr/>
           <a:lstStyle/>
           <a:p>
-            <a:pPr/>
             <a:r>
               <a:t>Some easy high level stuff […]</a:t>
             </a:r>
@@ -3288,12 +3709,12 @@
   <p:clrMapOvr>
     <a:masterClrMapping/>
   </p:clrMapOvr>
-  <p:transition xmlns:p14="http://schemas.microsoft.com/office/powerpoint/2010/main" spd="med" advClick="1" p14:dur="1000"/>
+  <p:transition spd="slow"/>
 </p:sld>
 </file>
 
 <file path=ppt/slides/slide4.xml><?xml version="1.0" encoding="utf-8"?>
-<p:sld xmlns:a="http://schemas.openxmlformats.org/drawingml/2006/main" xmlns:r="http://schemas.openxmlformats.org/officeDocument/2006/relationships" xmlns:p="http://schemas.openxmlformats.org/presentationml/2006/main" showMasterSp="1" showMasterPhAnim="1">
+<p:sld xmlns:a="http://schemas.openxmlformats.org/drawingml/2006/main" xmlns:r="http://schemas.openxmlformats.org/officeDocument/2006/relationships" xmlns:p="http://schemas.openxmlformats.org/presentationml/2006/main">
   <p:cSld>
     <p:spTree>
       <p:nvGrpSpPr>
@@ -3312,7 +3733,9 @@
       <p:sp>
         <p:nvSpPr>
           <p:cNvPr id="134" name="Shape 134"/>
-          <p:cNvSpPr/>
+          <p:cNvSpPr>
+            <a:spLocks noGrp="1"/>
+          </p:cNvSpPr>
           <p:nvPr>
             <p:ph type="title"/>
           </p:nvPr>
@@ -3330,7 +3753,6 @@
           <a:bodyPr/>
           <a:lstStyle/>
           <a:p>
-            <a:pPr/>
             <a:r>
               <a:t>Landmarks Loss</a:t>
             </a:r>
@@ -3340,7 +3762,9 @@
       <p:sp>
         <p:nvSpPr>
           <p:cNvPr id="135" name="Shape 135"/>
-          <p:cNvSpPr/>
+          <p:cNvSpPr>
+            <a:spLocks noGrp="1"/>
+          </p:cNvSpPr>
           <p:nvPr>
             <p:ph type="body" idx="1"/>
           </p:nvPr>
@@ -3358,7 +3782,7 @@
           <a:bodyPr/>
           <a:lstStyle/>
           <a:p>
-            <a:pPr/>
+            <a:endParaRPr/>
           </a:p>
         </p:txBody>
       </p:sp>
@@ -3396,12 +3820,12 @@
   <p:clrMapOvr>
     <a:masterClrMapping/>
   </p:clrMapOvr>
-  <p:transition xmlns:p14="http://schemas.microsoft.com/office/powerpoint/2010/main" spd="med" advClick="1" p14:dur="1000"/>
+  <p:transition spd="slow"/>
 </p:sld>
 </file>
 
 <file path=ppt/slides/slide5.xml><?xml version="1.0" encoding="utf-8"?>
-<p:sld xmlns:a="http://schemas.openxmlformats.org/drawingml/2006/main" xmlns:r="http://schemas.openxmlformats.org/officeDocument/2006/relationships" xmlns:p="http://schemas.openxmlformats.org/presentationml/2006/main" showMasterSp="1" showMasterPhAnim="1">
+<p:sld xmlns:a="http://schemas.openxmlformats.org/drawingml/2006/main" xmlns:r="http://schemas.openxmlformats.org/officeDocument/2006/relationships" xmlns:p="http://schemas.openxmlformats.org/presentationml/2006/main">
   <p:cSld>
     <p:spTree>
       <p:nvGrpSpPr>
@@ -3420,7 +3844,9 @@
       <p:sp>
         <p:nvSpPr>
           <p:cNvPr id="138" name="Shape 138"/>
-          <p:cNvSpPr/>
+          <p:cNvSpPr>
+            <a:spLocks noGrp="1"/>
+          </p:cNvSpPr>
           <p:nvPr>
             <p:ph type="title"/>
           </p:nvPr>
@@ -3438,7 +3864,6 @@
           <a:bodyPr/>
           <a:lstStyle/>
           <a:p>
-            <a:pPr/>
             <a:r>
               <a:t>Conditional cycleGAN</a:t>
             </a:r>
@@ -3448,7 +3873,9 @@
       <p:sp>
         <p:nvSpPr>
           <p:cNvPr id="139" name="Shape 139"/>
-          <p:cNvSpPr/>
+          <p:cNvSpPr>
+            <a:spLocks noGrp="1"/>
+          </p:cNvSpPr>
           <p:nvPr>
             <p:ph type="body" idx="1"/>
           </p:nvPr>
@@ -3466,7 +3893,6 @@
           <a:bodyPr/>
           <a:lstStyle/>
           <a:p>
-            <a:pPr/>
             <a:r>
               <a:t>Conditional GAN uses a class label to condition on to both the generator and discriminator, which shows that the model can generate MNIST digits conditioned on class labels. </a:t>
             </a:r>
@@ -3550,7 +3976,7 @@
           </a:ln>
           <a:extLst>
             <a:ext uri="{C572A759-6A51-4108-AA02-DFA0A04FC94B}">
-              <ma14:wrappingTextBoxFlag xmlns:ma14="http://schemas.microsoft.com/office/mac/drawingml/2011/main" val="1"/>
+              <ma14:wrappingTextBoxFlag xmlns:ma14="http://schemas.microsoft.com/office/mac/drawingml/2011/main" xmlns="" val="1"/>
             </a:ext>
           </a:extLst>
         </p:spPr>
@@ -3560,7 +3986,6 @@
           </a:bodyPr>
           <a:lstStyle/>
           <a:p>
-            <a:pPr/>
             <a:r>
               <a:t>Mirza M, Osindero S. Conditional generative adversarial nets. arXiv preprint arXiv:1411.1784. 2014 Nov 6.</a:t>
             </a:r>
@@ -3572,12 +3997,12 @@
   <p:clrMapOvr>
     <a:masterClrMapping/>
   </p:clrMapOvr>
-  <p:transition xmlns:p14="http://schemas.microsoft.com/office/powerpoint/2010/main" spd="med" advClick="1" p14:dur="1000"/>
+  <p:transition spd="slow"/>
 </p:sld>
 </file>
 
 <file path=ppt/slides/slide6.xml><?xml version="1.0" encoding="utf-8"?>
-<p:sld xmlns:a="http://schemas.openxmlformats.org/drawingml/2006/main" xmlns:r="http://schemas.openxmlformats.org/officeDocument/2006/relationships" xmlns:p="http://schemas.openxmlformats.org/presentationml/2006/main" showMasterSp="1" showMasterPhAnim="1">
+<p:sld xmlns:a="http://schemas.openxmlformats.org/drawingml/2006/main" xmlns:r="http://schemas.openxmlformats.org/officeDocument/2006/relationships" xmlns:p="http://schemas.openxmlformats.org/presentationml/2006/main">
   <p:cSld>
     <p:spTree>
       <p:nvGrpSpPr>
@@ -3596,7 +4021,9 @@
       <p:sp>
         <p:nvSpPr>
           <p:cNvPr id="144" name="Shape 144"/>
-          <p:cNvSpPr/>
+          <p:cNvSpPr>
+            <a:spLocks noGrp="1"/>
+          </p:cNvSpPr>
           <p:nvPr>
             <p:ph type="title"/>
           </p:nvPr>
@@ -3610,7 +4037,6 @@
           <a:bodyPr/>
           <a:lstStyle/>
           <a:p>
-            <a:pPr/>
             <a:r>
               <a:t>Conditional cycleGAN Results</a:t>
             </a:r>
@@ -3665,7 +4091,7 @@
           </a:ln>
           <a:extLst>
             <a:ext uri="{C572A759-6A51-4108-AA02-DFA0A04FC94B}">
-              <ma14:wrappingTextBoxFlag xmlns:ma14="http://schemas.microsoft.com/office/mac/drawingml/2011/main" val="1"/>
+              <ma14:wrappingTextBoxFlag xmlns:ma14="http://schemas.microsoft.com/office/mac/drawingml/2011/main" xmlns="" val="1"/>
             </a:ext>
           </a:extLst>
         </p:spPr>
@@ -3675,7 +4101,6 @@
           </a:bodyPr>
           <a:lstStyle/>
           <a:p>
-            <a:pPr/>
             <a:r>
               <a:t>Mirza M, Osindero S. Conditional generative adversarial nets. arXiv preprint arXiv:1411.1784. 2014 Nov 6.</a:t>
             </a:r>
@@ -3745,12 +4170,12 @@
   <p:clrMapOvr>
     <a:masterClrMapping/>
   </p:clrMapOvr>
-  <p:transition xmlns:p14="http://schemas.microsoft.com/office/powerpoint/2010/main" spd="med" advClick="1" p14:dur="1000"/>
+  <p:transition spd="slow"/>
 </p:sld>
 </file>
 
 <file path=ppt/slides/slide7.xml><?xml version="1.0" encoding="utf-8"?>
-<p:sld xmlns:a="http://schemas.openxmlformats.org/drawingml/2006/main" xmlns:r="http://schemas.openxmlformats.org/officeDocument/2006/relationships" xmlns:p="http://schemas.openxmlformats.org/presentationml/2006/main" showMasterSp="1" showMasterPhAnim="1">
+<p:sld xmlns:a="http://schemas.openxmlformats.org/drawingml/2006/main" xmlns:r="http://schemas.openxmlformats.org/officeDocument/2006/relationships" xmlns:p="http://schemas.openxmlformats.org/presentationml/2006/main">
   <p:cSld>
     <p:spTree>
       <p:nvGrpSpPr>
@@ -3769,7 +4194,9 @@
       <p:sp>
         <p:nvSpPr>
           <p:cNvPr id="150" name="Shape 150"/>
-          <p:cNvSpPr/>
+          <p:cNvSpPr>
+            <a:spLocks noGrp="1"/>
+          </p:cNvSpPr>
           <p:nvPr>
             <p:ph type="title"/>
           </p:nvPr>
@@ -3791,10 +4218,12 @@
             </a:lvl1pPr>
           </a:lstStyle>
           <a:p>
-            <a:pPr/>
-            <a:r>
-              <a:t>An Example</a:t>
-            </a:r>
+            <a:pPr algn="ctr"/>
+            <a:r>
+              <a:rPr lang="de-CH" dirty="0"/>
+              <a:t>Demo</a:t>
+            </a:r>
+            <a:endParaRPr dirty="0"/>
           </a:p>
         </p:txBody>
       </p:sp>
@@ -3832,12 +4261,12 @@
   <p:clrMapOvr>
     <a:masterClrMapping/>
   </p:clrMapOvr>
-  <p:transition xmlns:p14="http://schemas.microsoft.com/office/powerpoint/2010/main" spd="med" advClick="1" p14:dur="1000"/>
+  <p:transition spd="slow"/>
 </p:sld>
 </file>
 
 <file path=ppt/slides/slide8.xml><?xml version="1.0" encoding="utf-8"?>
-<p:sld xmlns:a="http://schemas.openxmlformats.org/drawingml/2006/main" xmlns:r="http://schemas.openxmlformats.org/officeDocument/2006/relationships" xmlns:p="http://schemas.openxmlformats.org/presentationml/2006/main" showMasterSp="1" showMasterPhAnim="1">
+<p:sld xmlns:a="http://schemas.openxmlformats.org/drawingml/2006/main" xmlns:r="http://schemas.openxmlformats.org/officeDocument/2006/relationships" xmlns:p="http://schemas.openxmlformats.org/presentationml/2006/main">
   <p:cSld>
     <p:spTree>
       <p:nvGrpSpPr>
@@ -3856,7 +4285,9 @@
       <p:sp>
         <p:nvSpPr>
           <p:cNvPr id="153" name="Shape 153"/>
-          <p:cNvSpPr/>
+          <p:cNvSpPr>
+            <a:spLocks noGrp="1"/>
+          </p:cNvSpPr>
           <p:nvPr>
             <p:ph type="title"/>
           </p:nvPr>
@@ -3874,17 +4305,24 @@
           <a:bodyPr/>
           <a:lstStyle/>
           <a:p>
-            <a:pPr/>
-            <a:r>
-              <a:t>Conclusion and Outlook</a:t>
-            </a:r>
+            <a:r>
+              <a:rPr dirty="0" err="1"/>
+              <a:t>Conclusio</a:t>
+            </a:r>
+            <a:r>
+              <a:rPr lang="de-CH" dirty="0" err="1"/>
+              <a:t>n</a:t>
+            </a:r>
+            <a:endParaRPr dirty="0"/>
           </a:p>
         </p:txBody>
       </p:sp>
       <p:sp>
         <p:nvSpPr>
           <p:cNvPr id="154" name="Shape 154"/>
-          <p:cNvSpPr/>
+          <p:cNvSpPr>
+            <a:spLocks noGrp="1"/>
+          </p:cNvSpPr>
           <p:nvPr>
             <p:ph type="body" idx="1"/>
           </p:nvPr>
@@ -3902,7 +4340,167 @@
           <a:bodyPr/>
           <a:lstStyle/>
           <a:p>
-            <a:pPr/>
+            <a:r>
+              <a:rPr lang="de-CH" dirty="0" err="1"/>
+              <a:t>features</a:t>
+            </a:r>
+            <a:r>
+              <a:rPr lang="de-CH" dirty="0"/>
+              <a:t> </a:t>
+            </a:r>
+            <a:r>
+              <a:rPr lang="de-CH" dirty="0" err="1"/>
+              <a:t>are</a:t>
+            </a:r>
+            <a:r>
+              <a:rPr lang="de-CH" dirty="0"/>
+              <a:t> </a:t>
+            </a:r>
+            <a:r>
+              <a:rPr lang="de-CH" dirty="0" err="1"/>
+              <a:t>preserved</a:t>
+            </a:r>
+            <a:r>
+              <a:rPr lang="de-CH" dirty="0"/>
+              <a:t>: e.g. </a:t>
+            </a:r>
+            <a:r>
+              <a:rPr lang="de-CH" dirty="0" err="1"/>
+              <a:t>beards</a:t>
+            </a:r>
+            <a:r>
+              <a:rPr lang="de-CH" dirty="0"/>
+              <a:t> </a:t>
+            </a:r>
+            <a:r>
+              <a:rPr lang="de-CH" dirty="0" err="1"/>
+              <a:t>and</a:t>
+            </a:r>
+            <a:r>
+              <a:rPr lang="de-CH" dirty="0"/>
+              <a:t> </a:t>
+            </a:r>
+            <a:r>
+              <a:rPr lang="de-CH" dirty="0" err="1"/>
+              <a:t>glasses</a:t>
+            </a:r>
+            <a:endParaRPr lang="de-CH" dirty="0"/>
+          </a:p>
+          <a:p>
+            <a:endParaRPr lang="de-CH" dirty="0"/>
+          </a:p>
+          <a:p>
+            <a:r>
+              <a:rPr lang="de-CH" dirty="0" err="1"/>
+              <a:t>with</a:t>
+            </a:r>
+            <a:r>
+              <a:rPr lang="de-CH" dirty="0"/>
+              <a:t> Landmark </a:t>
+            </a:r>
+            <a:r>
+              <a:rPr lang="de-CH" dirty="0" err="1"/>
+              <a:t>losses</a:t>
+            </a:r>
+            <a:r>
+              <a:rPr lang="de-CH" dirty="0"/>
+              <a:t>, </a:t>
+            </a:r>
+            <a:r>
+              <a:rPr lang="de-CH" dirty="0" err="1"/>
+              <a:t>CycleGAN</a:t>
+            </a:r>
+            <a:r>
+              <a:rPr lang="de-CH" dirty="0"/>
+              <a:t> was </a:t>
+            </a:r>
+            <a:r>
+              <a:rPr lang="de-CH" dirty="0" err="1"/>
+              <a:t>extended</a:t>
+            </a:r>
+            <a:r>
+              <a:rPr lang="de-CH" dirty="0"/>
+              <a:t> in a </a:t>
+            </a:r>
+            <a:r>
+              <a:rPr lang="de-CH" dirty="0" err="1"/>
+              <a:t>natural</a:t>
+            </a:r>
+            <a:r>
+              <a:rPr lang="de-CH" dirty="0"/>
+              <a:t> </a:t>
+            </a:r>
+            <a:r>
+              <a:rPr lang="de-CH" dirty="0" err="1"/>
+              <a:t>way</a:t>
+            </a:r>
+            <a:endParaRPr lang="de-CH" dirty="0"/>
+          </a:p>
+          <a:p>
+            <a:endParaRPr lang="de-CH" dirty="0"/>
+          </a:p>
+          <a:p>
+            <a:r>
+              <a:rPr lang="de-CH" dirty="0" err="1"/>
+              <a:t>for</a:t>
+            </a:r>
+            <a:r>
+              <a:rPr lang="de-CH" dirty="0"/>
+              <a:t> </a:t>
+            </a:r>
+            <a:r>
+              <a:rPr lang="de-CH" dirty="0" err="1"/>
+              <a:t>meaningful</a:t>
+            </a:r>
+            <a:r>
+              <a:rPr lang="de-CH" dirty="0"/>
+              <a:t> </a:t>
+            </a:r>
+            <a:r>
+              <a:rPr lang="de-CH" dirty="0" err="1"/>
+              <a:t>results</a:t>
+            </a:r>
+            <a:r>
+              <a:rPr lang="de-CH" dirty="0"/>
+              <a:t> </a:t>
+            </a:r>
+            <a:r>
+              <a:rPr lang="de-CH" dirty="0" err="1"/>
+              <a:t>training</a:t>
+            </a:r>
+            <a:r>
+              <a:rPr lang="de-CH" dirty="0"/>
+              <a:t> </a:t>
+            </a:r>
+            <a:r>
+              <a:rPr lang="de-CH" dirty="0" err="1"/>
+              <a:t>of</a:t>
+            </a:r>
+            <a:r>
+              <a:rPr lang="de-CH" dirty="0"/>
+              <a:t> 24 – 36 </a:t>
+            </a:r>
+            <a:r>
+              <a:rPr lang="de-CH" dirty="0" err="1"/>
+              <a:t>hours</a:t>
+            </a:r>
+            <a:r>
+              <a:rPr lang="de-CH" dirty="0"/>
+              <a:t> </a:t>
+            </a:r>
+            <a:r>
+              <a:rPr lang="de-CH" dirty="0" err="1"/>
+              <a:t>were</a:t>
+            </a:r>
+            <a:r>
+              <a:rPr lang="de-CH" dirty="0"/>
+              <a:t> </a:t>
+            </a:r>
+            <a:r>
+              <a:rPr lang="de-CH" dirty="0" err="1"/>
+              <a:t>required</a:t>
+            </a:r>
+            <a:endParaRPr lang="de-CH" dirty="0"/>
           </a:p>
         </p:txBody>
       </p:sp>
@@ -3915,7 +4513,7 @@
           <p:nvPr/>
         </p:nvPicPr>
         <p:blipFill>
-          <a:blip r:embed="rId2">
+          <a:blip r:embed="rId3">
             <a:extLst/>
           </a:blip>
           <a:stretch>
@@ -3940,12 +4538,12 @@
   <p:clrMapOvr>
     <a:masterClrMapping/>
   </p:clrMapOvr>
-  <p:transition xmlns:p14="http://schemas.microsoft.com/office/powerpoint/2010/main" spd="med" advClick="1" p14:dur="1000"/>
+  <p:transition spd="slow"/>
 </p:sld>
 </file>
 
 <file path=ppt/slides/slide9.xml><?xml version="1.0" encoding="utf-8"?>
-<p:sld xmlns:a="http://schemas.openxmlformats.org/drawingml/2006/main" xmlns:r="http://schemas.openxmlformats.org/officeDocument/2006/relationships" xmlns:p="http://schemas.openxmlformats.org/presentationml/2006/main" showMasterSp="1" showMasterPhAnim="1">
+<p:sld xmlns:a="http://schemas.openxmlformats.org/drawingml/2006/main" xmlns:r="http://schemas.openxmlformats.org/officeDocument/2006/relationships" xmlns:p="http://schemas.openxmlformats.org/presentationml/2006/main">
   <p:cSld>
     <p:spTree>
       <p:nvGrpSpPr>
@@ -3963,16 +4561,18 @@
       </p:grpSpPr>
       <p:sp>
         <p:nvSpPr>
-          <p:cNvPr id="157" name="Shape 157"/>
-          <p:cNvSpPr/>
+          <p:cNvPr id="153" name="Shape 153"/>
+          <p:cNvSpPr>
+            <a:spLocks noGrp="1"/>
+          </p:cNvSpPr>
           <p:nvPr>
             <p:ph type="title"/>
           </p:nvPr>
         </p:nvSpPr>
         <p:spPr>
           <a:xfrm>
-            <a:off x="4097654" y="2766217"/>
-            <a:ext cx="3996691" cy="1325564"/>
+            <a:off x="838200" y="365125"/>
+            <a:ext cx="10515600" cy="1325563"/>
           </a:xfrm>
           <a:prstGeom prst="rect">
             <a:avLst/>
@@ -3980,29 +4580,292 @@
         </p:spPr>
         <p:txBody>
           <a:bodyPr/>
-          <a:lstStyle>
-            <a:lvl1pPr>
-              <a:defRPr sz="6000"/>
-            </a:lvl1pPr>
-          </a:lstStyle>
-          <a:p>
-            <a:pPr/>
-            <a:r>
-              <a:t>Questions?</a:t>
-            </a:r>
+          <a:lstStyle/>
+          <a:p>
+            <a:r>
+              <a:rPr dirty="0"/>
+              <a:t>Outlook</a:t>
+            </a:r>
+          </a:p>
+        </p:txBody>
+      </p:sp>
+      <p:sp>
+        <p:nvSpPr>
+          <p:cNvPr id="154" name="Shape 154"/>
+          <p:cNvSpPr>
+            <a:spLocks noGrp="1"/>
+          </p:cNvSpPr>
+          <p:nvPr>
+            <p:ph type="body" idx="1"/>
+          </p:nvPr>
+        </p:nvSpPr>
+        <p:spPr>
+          <a:xfrm>
+            <a:off x="838200" y="1825624"/>
+            <a:ext cx="10515600" cy="4803775"/>
+          </a:xfrm>
+          <a:prstGeom prst="rect">
+            <a:avLst/>
+          </a:prstGeom>
+        </p:spPr>
+        <p:txBody>
+          <a:bodyPr/>
+          <a:lstStyle/>
+          <a:p>
+            <a:r>
+              <a:rPr lang="de-CH" dirty="0" err="1"/>
+              <a:t>more</a:t>
+            </a:r>
+            <a:r>
+              <a:rPr lang="de-CH" dirty="0"/>
+              <a:t> </a:t>
+            </a:r>
+            <a:r>
+              <a:rPr lang="de-CH" dirty="0" err="1"/>
+              <a:t>landmarks</a:t>
+            </a:r>
+            <a:endParaRPr lang="de-CH" dirty="0"/>
+          </a:p>
+          <a:p>
+            <a:endParaRPr lang="de-CH" dirty="0"/>
+          </a:p>
+          <a:p>
+            <a:r>
+              <a:rPr lang="de-CH" dirty="0"/>
+              <a:t>sensitive </a:t>
+            </a:r>
+            <a:r>
+              <a:rPr lang="de-CH" dirty="0" err="1"/>
+              <a:t>to</a:t>
+            </a:r>
+            <a:r>
+              <a:rPr lang="de-CH" dirty="0"/>
+              <a:t> </a:t>
+            </a:r>
+            <a:r>
+              <a:rPr lang="de-CH" dirty="0" err="1"/>
+              <a:t>background</a:t>
+            </a:r>
+            <a:r>
+              <a:rPr lang="de-CH" dirty="0"/>
+              <a:t> </a:t>
+            </a:r>
+            <a:r>
+              <a:rPr lang="de-CH" dirty="0" err="1"/>
+              <a:t>and</a:t>
+            </a:r>
+            <a:r>
+              <a:rPr lang="de-CH" dirty="0"/>
+              <a:t> </a:t>
+            </a:r>
+            <a:r>
+              <a:rPr lang="de-CH" dirty="0" err="1"/>
+              <a:t>illumination</a:t>
+            </a:r>
+            <a:r>
+              <a:rPr lang="de-CH" dirty="0"/>
+              <a:t> </a:t>
+            </a:r>
+            <a:r>
+              <a:rPr lang="de-CH" dirty="0" err="1"/>
+              <a:t>and</a:t>
+            </a:r>
+            <a:r>
+              <a:rPr lang="de-CH" dirty="0"/>
+              <a:t> </a:t>
+            </a:r>
+            <a:r>
+              <a:rPr lang="de-CH" dirty="0" err="1"/>
+              <a:t>view</a:t>
+            </a:r>
+            <a:r>
+              <a:rPr lang="de-CH" dirty="0"/>
+              <a:t> </a:t>
+            </a:r>
+            <a:r>
+              <a:rPr lang="de-CH" dirty="0" err="1"/>
+              <a:t>point</a:t>
+            </a:r>
+            <a:endParaRPr lang="de-CH" dirty="0"/>
+          </a:p>
+          <a:p>
+            <a:endParaRPr lang="de-CH" dirty="0"/>
+          </a:p>
+          <a:p>
+            <a:r>
+              <a:rPr lang="de-CH" dirty="0" err="1"/>
+              <a:t>identify</a:t>
+            </a:r>
+            <a:r>
+              <a:rPr lang="de-CH" dirty="0"/>
+              <a:t> </a:t>
+            </a:r>
+            <a:r>
+              <a:rPr lang="de-CH" dirty="0" err="1"/>
+              <a:t>background</a:t>
+            </a:r>
+            <a:r>
+              <a:rPr lang="de-CH" dirty="0"/>
+              <a:t> in </a:t>
+            </a:r>
+            <a:r>
+              <a:rPr lang="de-CH" dirty="0" err="1"/>
+              <a:t>the</a:t>
+            </a:r>
+            <a:r>
+              <a:rPr lang="de-CH" dirty="0"/>
+              <a:t> real </a:t>
+            </a:r>
+            <a:r>
+              <a:rPr lang="de-CH" dirty="0" err="1"/>
+              <a:t>images</a:t>
+            </a:r>
+            <a:r>
+              <a:rPr lang="de-CH" dirty="0"/>
+              <a:t> </a:t>
+            </a:r>
+            <a:r>
+              <a:rPr lang="de-CH" dirty="0" err="1"/>
+              <a:t>and</a:t>
+            </a:r>
+            <a:r>
+              <a:rPr lang="de-CH" dirty="0"/>
+              <a:t> </a:t>
+            </a:r>
+            <a:r>
+              <a:rPr lang="de-CH" dirty="0" err="1"/>
+              <a:t>set</a:t>
+            </a:r>
+            <a:r>
+              <a:rPr lang="de-CH" dirty="0"/>
+              <a:t> </a:t>
+            </a:r>
+            <a:r>
+              <a:rPr lang="de-CH" dirty="0" err="1"/>
+              <a:t>it</a:t>
+            </a:r>
+            <a:r>
+              <a:rPr lang="de-CH" dirty="0"/>
+              <a:t> </a:t>
+            </a:r>
+            <a:r>
+              <a:rPr lang="de-CH" dirty="0" err="1"/>
+              <a:t>to</a:t>
+            </a:r>
+            <a:r>
+              <a:rPr lang="de-CH" dirty="0"/>
+              <a:t> </a:t>
+            </a:r>
+            <a:r>
+              <a:rPr lang="de-CH" dirty="0" err="1"/>
+              <a:t>white</a:t>
+            </a:r>
+            <a:endParaRPr lang="de-CH" dirty="0"/>
+          </a:p>
+          <a:p>
+            <a:endParaRPr lang="de-CH" dirty="0"/>
+          </a:p>
+          <a:p>
+            <a:r>
+              <a:rPr lang="de-CH" dirty="0" err="1"/>
+              <a:t>augmentation</a:t>
+            </a:r>
+            <a:r>
+              <a:rPr lang="de-CH" dirty="0"/>
+              <a:t> </a:t>
+            </a:r>
+            <a:r>
+              <a:rPr lang="de-CH" dirty="0" err="1"/>
+              <a:t>of</a:t>
+            </a:r>
+            <a:r>
+              <a:rPr lang="de-CH" dirty="0"/>
+              <a:t> </a:t>
+            </a:r>
+            <a:r>
+              <a:rPr lang="de-CH" dirty="0" err="1"/>
+              <a:t>dataset</a:t>
+            </a:r>
+            <a:endParaRPr lang="de-CH" dirty="0"/>
+          </a:p>
+          <a:p>
+            <a:endParaRPr lang="de-CH" dirty="0"/>
+          </a:p>
+          <a:p>
+            <a:r>
+              <a:rPr lang="de-CH" dirty="0" err="1"/>
+              <a:t>Extend</a:t>
+            </a:r>
+            <a:r>
+              <a:rPr lang="de-CH" dirty="0"/>
+              <a:t> </a:t>
+            </a:r>
+            <a:r>
+              <a:rPr lang="de-CH" dirty="0" err="1"/>
+              <a:t>conditional</a:t>
+            </a:r>
+            <a:r>
+              <a:rPr lang="de-CH" dirty="0"/>
+              <a:t> </a:t>
+            </a:r>
+            <a:r>
+              <a:rPr lang="de-CH" dirty="0" err="1"/>
+              <a:t>architecture</a:t>
+            </a:r>
+            <a:r>
+              <a:rPr lang="de-CH" dirty="0"/>
+              <a:t> </a:t>
+            </a:r>
+            <a:r>
+              <a:rPr lang="de-CH" dirty="0" err="1"/>
+              <a:t>to</a:t>
+            </a:r>
+            <a:r>
+              <a:rPr lang="de-CH" dirty="0"/>
+              <a:t> </a:t>
+            </a:r>
+            <a:r>
+              <a:rPr lang="de-CH" dirty="0" err="1"/>
+              <a:t>differentiate</a:t>
+            </a:r>
+            <a:r>
+              <a:rPr lang="de-CH" dirty="0"/>
+              <a:t> </a:t>
+            </a:r>
+            <a:r>
+              <a:rPr lang="de-CH" dirty="0" err="1"/>
+              <a:t>between</a:t>
+            </a:r>
+            <a:r>
+              <a:rPr lang="de-CH" dirty="0"/>
+              <a:t> </a:t>
+            </a:r>
+            <a:r>
+              <a:rPr lang="de-CH" dirty="0" err="1"/>
+              <a:t>skin</a:t>
+            </a:r>
+            <a:r>
+              <a:rPr lang="de-CH" dirty="0"/>
+              <a:t> </a:t>
+            </a:r>
+            <a:r>
+              <a:rPr lang="de-CH" dirty="0" err="1"/>
+              <a:t>colours</a:t>
+            </a:r>
+            <a:endParaRPr lang="de-CH" dirty="0"/>
           </a:p>
         </p:txBody>
       </p:sp>
       <p:pic>
         <p:nvPicPr>
-          <p:cNvPr id="158" name="image2.png"/>
+          <p:cNvPr id="155" name="image2.png"/>
           <p:cNvPicPr>
             <a:picLocks noChangeAspect="1"/>
           </p:cNvPicPr>
           <p:nvPr/>
         </p:nvPicPr>
         <p:blipFill>
-          <a:blip r:embed="rId2">
+          <a:blip r:embed="rId3">
             <a:extLst/>
           </a:blip>
           <a:stretch>
@@ -4023,16 +4886,21 @@
         </p:spPr>
       </p:pic>
     </p:spTree>
+    <p:extLst>
+      <p:ext uri="{BB962C8B-B14F-4D97-AF65-F5344CB8AC3E}">
+        <p14:creationId xmlns:p14="http://schemas.microsoft.com/office/powerpoint/2010/main" val="3993776034"/>
+      </p:ext>
+    </p:extLst>
   </p:cSld>
   <p:clrMapOvr>
     <a:masterClrMapping/>
   </p:clrMapOvr>
-  <p:transition xmlns:p14="http://schemas.microsoft.com/office/powerpoint/2010/main" spd="med" advClick="1" p14:dur="1000"/>
+  <p:transition spd="slow"/>
 </p:sld>
 </file>
 
 <file path=ppt/theme/theme1.xml><?xml version="1.0" encoding="utf-8"?>
-<a:theme xmlns:a="http://schemas.openxmlformats.org/drawingml/2006/main" xmlns:r="http://schemas.openxmlformats.org/officeDocument/2006/relationships" name="Office Theme">
+<a:theme xmlns:a="http://schemas.openxmlformats.org/drawingml/2006/main" name="Office Theme">
   <a:themeElements>
     <a:clrScheme name="Office Theme">
       <a:dk1>
@@ -4234,7 +5102,7 @@
         <a:effectLst/>
         <a:sp3d/>
       </a:spPr>
-      <a:bodyPr rot="0" spcFirstLastPara="1" vertOverflow="overflow" horzOverflow="overflow" vert="horz" wrap="square" lIns="45719" tIns="45719" rIns="45719" bIns="45719" numCol="1" spcCol="38100" rtlCol="0" anchor="ctr" upright="0">
+      <a:bodyPr rot="0" spcFirstLastPara="1" vertOverflow="overflow" horzOverflow="overflow" vert="horz" wrap="square" lIns="45719" tIns="45719" rIns="45719" bIns="45719" numCol="1" spcCol="38100" rtlCol="0" anchor="ctr">
         <a:spAutoFit/>
       </a:bodyPr>
       <a:lstStyle>
@@ -4253,7 +5121,7 @@
           <a:buFontTx/>
           <a:buNone/>
           <a:tabLst/>
-          <a:defRPr b="0" baseline="0" cap="none" i="0" spc="0" strike="noStrike" sz="1800" u="none" kumimoji="0" normalizeH="0">
+          <a:defRPr kumimoji="0" sz="1800" b="0" i="0" u="none" strike="noStrike" cap="none" spc="0" normalizeH="0" baseline="0">
             <a:ln>
               <a:noFill/>
             </a:ln>
@@ -4283,7 +5151,7 @@
           <a:buFontTx/>
           <a:buNone/>
           <a:tabLst/>
-          <a:defRPr b="0" baseline="0" cap="none" i="0" spc="0" strike="noStrike" sz="1800" u="none" kumimoji="0" normalizeH="0">
+          <a:defRPr kumimoji="0" sz="1800" b="0" i="0" u="none" strike="noStrike" cap="none" spc="0" normalizeH="0" baseline="0">
             <a:ln>
               <a:noFill/>
             </a:ln>
@@ -4309,7 +5177,7 @@
           <a:buFontTx/>
           <a:buNone/>
           <a:tabLst/>
-          <a:defRPr b="0" baseline="0" cap="none" i="0" spc="0" strike="noStrike" sz="1800" u="none" kumimoji="0" normalizeH="0">
+          <a:defRPr kumimoji="0" sz="1800" b="0" i="0" u="none" strike="noStrike" cap="none" spc="0" normalizeH="0" baseline="0">
             <a:ln>
               <a:noFill/>
             </a:ln>
@@ -4335,7 +5203,7 @@
           <a:buFontTx/>
           <a:buNone/>
           <a:tabLst/>
-          <a:defRPr b="0" baseline="0" cap="none" i="0" spc="0" strike="noStrike" sz="1800" u="none" kumimoji="0" normalizeH="0">
+          <a:defRPr kumimoji="0" sz="1800" b="0" i="0" u="none" strike="noStrike" cap="none" spc="0" normalizeH="0" baseline="0">
             <a:ln>
               <a:noFill/>
             </a:ln>
@@ -4361,7 +5229,7 @@
           <a:buFontTx/>
           <a:buNone/>
           <a:tabLst/>
-          <a:defRPr b="0" baseline="0" cap="none" i="0" spc="0" strike="noStrike" sz="1800" u="none" kumimoji="0" normalizeH="0">
+          <a:defRPr kumimoji="0" sz="1800" b="0" i="0" u="none" strike="noStrike" cap="none" spc="0" normalizeH="0" baseline="0">
             <a:ln>
               <a:noFill/>
             </a:ln>
@@ -4387,7 +5255,7 @@
           <a:buFontTx/>
           <a:buNone/>
           <a:tabLst/>
-          <a:defRPr b="0" baseline="0" cap="none" i="0" spc="0" strike="noStrike" sz="1800" u="none" kumimoji="0" normalizeH="0">
+          <a:defRPr kumimoji="0" sz="1800" b="0" i="0" u="none" strike="noStrike" cap="none" spc="0" normalizeH="0" baseline="0">
             <a:ln>
               <a:noFill/>
             </a:ln>
@@ -4413,7 +5281,7 @@
           <a:buFontTx/>
           <a:buNone/>
           <a:tabLst/>
-          <a:defRPr b="0" baseline="0" cap="none" i="0" spc="0" strike="noStrike" sz="1800" u="none" kumimoji="0" normalizeH="0">
+          <a:defRPr kumimoji="0" sz="1800" b="0" i="0" u="none" strike="noStrike" cap="none" spc="0" normalizeH="0" baseline="0">
             <a:ln>
               <a:noFill/>
             </a:ln>
@@ -4439,7 +5307,7 @@
           <a:buFontTx/>
           <a:buNone/>
           <a:tabLst/>
-          <a:defRPr b="0" baseline="0" cap="none" i="0" spc="0" strike="noStrike" sz="1800" u="none" kumimoji="0" normalizeH="0">
+          <a:defRPr kumimoji="0" sz="1800" b="0" i="0" u="none" strike="noStrike" cap="none" spc="0" normalizeH="0" baseline="0">
             <a:ln>
               <a:noFill/>
             </a:ln>
@@ -4465,7 +5333,7 @@
           <a:buFontTx/>
           <a:buNone/>
           <a:tabLst/>
-          <a:defRPr b="0" baseline="0" cap="none" i="0" spc="0" strike="noStrike" sz="1800" u="none" kumimoji="0" normalizeH="0">
+          <a:defRPr kumimoji="0" sz="1800" b="0" i="0" u="none" strike="noStrike" cap="none" spc="0" normalizeH="0" baseline="0">
             <a:ln>
               <a:noFill/>
             </a:ln>
@@ -4491,7 +5359,7 @@
           <a:buFontTx/>
           <a:buNone/>
           <a:tabLst/>
-          <a:defRPr b="0" baseline="0" cap="none" i="0" spc="0" strike="noStrike" sz="1800" u="none" kumimoji="0" normalizeH="0">
+          <a:defRPr kumimoji="0" sz="1800" b="0" i="0" u="none" strike="noStrike" cap="none" spc="0" normalizeH="0" baseline="0">
             <a:ln>
               <a:noFill/>
             </a:ln>
@@ -4504,9 +5372,15 @@
         </a:lvl9pPr>
       </a:lstStyle>
       <a:style>
-        <a:lnRef idx="0"/>
-        <a:fillRef idx="0"/>
-        <a:effectRef idx="0"/>
+        <a:lnRef idx="0">
+          <a:scrgbClr r="0" g="0" b="0"/>
+        </a:lnRef>
+        <a:fillRef idx="0">
+          <a:scrgbClr r="0" g="0" b="0"/>
+        </a:fillRef>
+        <a:effectRef idx="0">
+          <a:scrgbClr r="0" g="0" b="0"/>
+        </a:effectRef>
         <a:fontRef idx="none"/>
       </a:style>
     </a:spDef>
@@ -4523,7 +5397,7 @@
         <a:effectLst/>
         <a:sp3d/>
       </a:spPr>
-      <a:bodyPr rot="0" spcFirstLastPara="1" vertOverflow="overflow" horzOverflow="overflow" vert="horz" wrap="square" lIns="91439" tIns="45719" rIns="91439" bIns="45719" numCol="1" spcCol="38100" rtlCol="0" anchor="t" upright="0">
+      <a:bodyPr rot="0" spcFirstLastPara="1" vertOverflow="overflow" horzOverflow="overflow" vert="horz" wrap="square" lIns="91439" tIns="45719" rIns="91439" bIns="45719" numCol="1" spcCol="38100" rtlCol="0" anchor="t">
         <a:noAutofit/>
       </a:bodyPr>
       <a:lstStyle>
@@ -4542,7 +5416,7 @@
           <a:buFontTx/>
           <a:buNone/>
           <a:tabLst/>
-          <a:defRPr b="0" baseline="0" cap="none" i="0" spc="0" strike="noStrike" sz="1800" u="none" kumimoji="0" normalizeH="0">
+          <a:defRPr kumimoji="0" sz="1800" b="0" i="0" u="none" strike="noStrike" cap="none" spc="0" normalizeH="0" baseline="0">
             <a:ln>
               <a:noFill/>
             </a:ln>
@@ -4568,7 +5442,7 @@
           <a:buFontTx/>
           <a:buNone/>
           <a:tabLst/>
-          <a:defRPr b="0" baseline="0" cap="none" i="0" spc="0" strike="noStrike" sz="1800" u="none" kumimoji="0" normalizeH="0">
+          <a:defRPr kumimoji="0" sz="1800" b="0" i="0" u="none" strike="noStrike" cap="none" spc="0" normalizeH="0" baseline="0">
             <a:ln>
               <a:noFill/>
             </a:ln>
@@ -4594,7 +5468,7 @@
           <a:buFontTx/>
           <a:buNone/>
           <a:tabLst/>
-          <a:defRPr b="0" baseline="0" cap="none" i="0" spc="0" strike="noStrike" sz="1800" u="none" kumimoji="0" normalizeH="0">
+          <a:defRPr kumimoji="0" sz="1800" b="0" i="0" u="none" strike="noStrike" cap="none" spc="0" normalizeH="0" baseline="0">
             <a:ln>
               <a:noFill/>
             </a:ln>
@@ -4620,7 +5494,7 @@
           <a:buFontTx/>
           <a:buNone/>
           <a:tabLst/>
-          <a:defRPr b="0" baseline="0" cap="none" i="0" spc="0" strike="noStrike" sz="1800" u="none" kumimoji="0" normalizeH="0">
+          <a:defRPr kumimoji="0" sz="1800" b="0" i="0" u="none" strike="noStrike" cap="none" spc="0" normalizeH="0" baseline="0">
             <a:ln>
               <a:noFill/>
             </a:ln>
@@ -4646,7 +5520,7 @@
           <a:buFontTx/>
           <a:buNone/>
           <a:tabLst/>
-          <a:defRPr b="0" baseline="0" cap="none" i="0" spc="0" strike="noStrike" sz="1800" u="none" kumimoji="0" normalizeH="0">
+          <a:defRPr kumimoji="0" sz="1800" b="0" i="0" u="none" strike="noStrike" cap="none" spc="0" normalizeH="0" baseline="0">
             <a:ln>
               <a:noFill/>
             </a:ln>
@@ -4672,7 +5546,7 @@
           <a:buFontTx/>
           <a:buNone/>
           <a:tabLst/>
-          <a:defRPr b="0" baseline="0" cap="none" i="0" spc="0" strike="noStrike" sz="1800" u="none" kumimoji="0" normalizeH="0">
+          <a:defRPr kumimoji="0" sz="1800" b="0" i="0" u="none" strike="noStrike" cap="none" spc="0" normalizeH="0" baseline="0">
             <a:ln>
               <a:noFill/>
             </a:ln>
@@ -4698,7 +5572,7 @@
           <a:buFontTx/>
           <a:buNone/>
           <a:tabLst/>
-          <a:defRPr b="0" baseline="0" cap="none" i="0" spc="0" strike="noStrike" sz="1800" u="none" kumimoji="0" normalizeH="0">
+          <a:defRPr kumimoji="0" sz="1800" b="0" i="0" u="none" strike="noStrike" cap="none" spc="0" normalizeH="0" baseline="0">
             <a:ln>
               <a:noFill/>
             </a:ln>
@@ -4724,7 +5598,7 @@
           <a:buFontTx/>
           <a:buNone/>
           <a:tabLst/>
-          <a:defRPr b="0" baseline="0" cap="none" i="0" spc="0" strike="noStrike" sz="1800" u="none" kumimoji="0" normalizeH="0">
+          <a:defRPr kumimoji="0" sz="1800" b="0" i="0" u="none" strike="noStrike" cap="none" spc="0" normalizeH="0" baseline="0">
             <a:ln>
               <a:noFill/>
             </a:ln>
@@ -4750,7 +5624,7 @@
           <a:buFontTx/>
           <a:buNone/>
           <a:tabLst/>
-          <a:defRPr b="0" baseline="0" cap="none" i="0" spc="0" strike="noStrike" sz="1800" u="none" kumimoji="0" normalizeH="0">
+          <a:defRPr kumimoji="0" sz="1800" b="0" i="0" u="none" strike="noStrike" cap="none" spc="0" normalizeH="0" baseline="0">
             <a:ln>
               <a:noFill/>
             </a:ln>
@@ -4776,7 +5650,7 @@
           <a:buFontTx/>
           <a:buNone/>
           <a:tabLst/>
-          <a:defRPr b="0" baseline="0" cap="none" i="0" spc="0" strike="noStrike" sz="1800" u="none" kumimoji="0" normalizeH="0">
+          <a:defRPr kumimoji="0" sz="1800" b="0" i="0" u="none" strike="noStrike" cap="none" spc="0" normalizeH="0" baseline="0">
             <a:ln>
               <a:noFill/>
             </a:ln>
@@ -4789,9 +5663,15 @@
         </a:lvl9pPr>
       </a:lstStyle>
       <a:style>
-        <a:lnRef idx="0"/>
-        <a:fillRef idx="0"/>
-        <a:effectRef idx="0"/>
+        <a:lnRef idx="0">
+          <a:scrgbClr r="0" g="0" b="0"/>
+        </a:lnRef>
+        <a:fillRef idx="0">
+          <a:scrgbClr r="0" g="0" b="0"/>
+        </a:fillRef>
+        <a:effectRef idx="0">
+          <a:scrgbClr r="0" g="0" b="0"/>
+        </a:effectRef>
         <a:fontRef idx="none"/>
       </a:style>
     </a:lnDef>
@@ -4805,7 +5685,7 @@
         <a:effectLst/>
         <a:sp3d/>
       </a:spPr>
-      <a:bodyPr rot="0" spcFirstLastPara="1" vertOverflow="overflow" horzOverflow="overflow" vert="horz" wrap="square" lIns="45719" tIns="45719" rIns="45719" bIns="45719" numCol="1" spcCol="38100" rtlCol="0" anchor="t" upright="0">
+      <a:bodyPr rot="0" spcFirstLastPara="1" vertOverflow="overflow" horzOverflow="overflow" vert="horz" wrap="square" lIns="45719" tIns="45719" rIns="45719" bIns="45719" numCol="1" spcCol="38100" rtlCol="0" anchor="t">
         <a:spAutoFit/>
       </a:bodyPr>
       <a:lstStyle>
@@ -4824,7 +5704,7 @@
           <a:buFontTx/>
           <a:buNone/>
           <a:tabLst/>
-          <a:defRPr b="0" baseline="0" cap="none" i="0" spc="0" strike="noStrike" sz="1800" u="none" kumimoji="0" normalizeH="0">
+          <a:defRPr kumimoji="0" sz="1800" b="0" i="0" u="none" strike="noStrike" cap="none" spc="0" normalizeH="0" baseline="0">
             <a:ln>
               <a:noFill/>
             </a:ln>
@@ -4854,7 +5734,7 @@
           <a:buFontTx/>
           <a:buNone/>
           <a:tabLst/>
-          <a:defRPr b="0" baseline="0" cap="none" i="0" spc="0" strike="noStrike" sz="1800" u="none" kumimoji="0" normalizeH="0">
+          <a:defRPr kumimoji="0" sz="1800" b="0" i="0" u="none" strike="noStrike" cap="none" spc="0" normalizeH="0" baseline="0">
             <a:ln>
               <a:noFill/>
             </a:ln>
@@ -4880,7 +5760,7 @@
           <a:buFontTx/>
           <a:buNone/>
           <a:tabLst/>
-          <a:defRPr b="0" baseline="0" cap="none" i="0" spc="0" strike="noStrike" sz="1800" u="none" kumimoji="0" normalizeH="0">
+          <a:defRPr kumimoji="0" sz="1800" b="0" i="0" u="none" strike="noStrike" cap="none" spc="0" normalizeH="0" baseline="0">
             <a:ln>
               <a:noFill/>
             </a:ln>
@@ -4906,7 +5786,7 @@
           <a:buFontTx/>
           <a:buNone/>
           <a:tabLst/>
-          <a:defRPr b="0" baseline="0" cap="none" i="0" spc="0" strike="noStrike" sz="1800" u="none" kumimoji="0" normalizeH="0">
+          <a:defRPr kumimoji="0" sz="1800" b="0" i="0" u="none" strike="noStrike" cap="none" spc="0" normalizeH="0" baseline="0">
             <a:ln>
               <a:noFill/>
             </a:ln>
@@ -4932,7 +5812,7 @@
           <a:buFontTx/>
           <a:buNone/>
           <a:tabLst/>
-          <a:defRPr b="0" baseline="0" cap="none" i="0" spc="0" strike="noStrike" sz="1800" u="none" kumimoji="0" normalizeH="0">
+          <a:defRPr kumimoji="0" sz="1800" b="0" i="0" u="none" strike="noStrike" cap="none" spc="0" normalizeH="0" baseline="0">
             <a:ln>
               <a:noFill/>
             </a:ln>
@@ -4958,7 +5838,7 @@
           <a:buFontTx/>
           <a:buNone/>
           <a:tabLst/>
-          <a:defRPr b="0" baseline="0" cap="none" i="0" spc="0" strike="noStrike" sz="1800" u="none" kumimoji="0" normalizeH="0">
+          <a:defRPr kumimoji="0" sz="1800" b="0" i="0" u="none" strike="noStrike" cap="none" spc="0" normalizeH="0" baseline="0">
             <a:ln>
               <a:noFill/>
             </a:ln>
@@ -4984,7 +5864,7 @@
           <a:buFontTx/>
           <a:buNone/>
           <a:tabLst/>
-          <a:defRPr b="0" baseline="0" cap="none" i="0" spc="0" strike="noStrike" sz="1800" u="none" kumimoji="0" normalizeH="0">
+          <a:defRPr kumimoji="0" sz="1800" b="0" i="0" u="none" strike="noStrike" cap="none" spc="0" normalizeH="0" baseline="0">
             <a:ln>
               <a:noFill/>
             </a:ln>
@@ -5010,7 +5890,7 @@
           <a:buFontTx/>
           <a:buNone/>
           <a:tabLst/>
-          <a:defRPr b="0" baseline="0" cap="none" i="0" spc="0" strike="noStrike" sz="1800" u="none" kumimoji="0" normalizeH="0">
+          <a:defRPr kumimoji="0" sz="1800" b="0" i="0" u="none" strike="noStrike" cap="none" spc="0" normalizeH="0" baseline="0">
             <a:ln>
               <a:noFill/>
             </a:ln>
@@ -5036,7 +5916,7 @@
           <a:buFontTx/>
           <a:buNone/>
           <a:tabLst/>
-          <a:defRPr b="0" baseline="0" cap="none" i="0" spc="0" strike="noStrike" sz="1800" u="none" kumimoji="0" normalizeH="0">
+          <a:defRPr kumimoji="0" sz="1800" b="0" i="0" u="none" strike="noStrike" cap="none" spc="0" normalizeH="0" baseline="0">
             <a:ln>
               <a:noFill/>
             </a:ln>
@@ -5062,7 +5942,7 @@
           <a:buFontTx/>
           <a:buNone/>
           <a:tabLst/>
-          <a:defRPr b="0" baseline="0" cap="none" i="0" spc="0" strike="noStrike" sz="1800" u="none" kumimoji="0" normalizeH="0">
+          <a:defRPr kumimoji="0" sz="1800" b="0" i="0" u="none" strike="noStrike" cap="none" spc="0" normalizeH="0" baseline="0">
             <a:ln>
               <a:noFill/>
             </a:ln>
@@ -5075,18 +5955,25 @@
         </a:lvl9pPr>
       </a:lstStyle>
       <a:style>
-        <a:lnRef idx="0"/>
-        <a:fillRef idx="0"/>
-        <a:effectRef idx="0"/>
+        <a:lnRef idx="0">
+          <a:scrgbClr r="0" g="0" b="0"/>
+        </a:lnRef>
+        <a:fillRef idx="0">
+          <a:scrgbClr r="0" g="0" b="0"/>
+        </a:fillRef>
+        <a:effectRef idx="0">
+          <a:scrgbClr r="0" g="0" b="0"/>
+        </a:effectRef>
         <a:fontRef idx="none"/>
       </a:style>
     </a:txDef>
   </a:objectDefaults>
+  <a:extraClrSchemeLst/>
 </a:theme>
 </file>
 
 <file path=ppt/theme/theme2.xml><?xml version="1.0" encoding="utf-8"?>
-<a:theme xmlns:a="http://schemas.openxmlformats.org/drawingml/2006/main" xmlns:r="http://schemas.openxmlformats.org/officeDocument/2006/relationships" name="Office Theme">
+<a:theme xmlns:a="http://schemas.openxmlformats.org/drawingml/2006/main" name="Office Theme">
   <a:themeElements>
     <a:clrScheme name="Office Theme">
       <a:dk1>
@@ -5288,7 +6175,7 @@
         <a:effectLst/>
         <a:sp3d/>
       </a:spPr>
-      <a:bodyPr rot="0" spcFirstLastPara="1" vertOverflow="overflow" horzOverflow="overflow" vert="horz" wrap="square" lIns="45719" tIns="45719" rIns="45719" bIns="45719" numCol="1" spcCol="38100" rtlCol="0" anchor="ctr" upright="0">
+      <a:bodyPr rot="0" spcFirstLastPara="1" vertOverflow="overflow" horzOverflow="overflow" vert="horz" wrap="square" lIns="45719" tIns="45719" rIns="45719" bIns="45719" numCol="1" spcCol="38100" rtlCol="0" anchor="ctr">
         <a:spAutoFit/>
       </a:bodyPr>
       <a:lstStyle>
@@ -5307,7 +6194,7 @@
           <a:buFontTx/>
           <a:buNone/>
           <a:tabLst/>
-          <a:defRPr b="0" baseline="0" cap="none" i="0" spc="0" strike="noStrike" sz="1800" u="none" kumimoji="0" normalizeH="0">
+          <a:defRPr kumimoji="0" sz="1800" b="0" i="0" u="none" strike="noStrike" cap="none" spc="0" normalizeH="0" baseline="0">
             <a:ln>
               <a:noFill/>
             </a:ln>
@@ -5337,7 +6224,7 @@
           <a:buFontTx/>
           <a:buNone/>
           <a:tabLst/>
-          <a:defRPr b="0" baseline="0" cap="none" i="0" spc="0" strike="noStrike" sz="1800" u="none" kumimoji="0" normalizeH="0">
+          <a:defRPr kumimoji="0" sz="1800" b="0" i="0" u="none" strike="noStrike" cap="none" spc="0" normalizeH="0" baseline="0">
             <a:ln>
               <a:noFill/>
             </a:ln>
@@ -5363,7 +6250,7 @@
           <a:buFontTx/>
           <a:buNone/>
           <a:tabLst/>
-          <a:defRPr b="0" baseline="0" cap="none" i="0" spc="0" strike="noStrike" sz="1800" u="none" kumimoji="0" normalizeH="0">
+          <a:defRPr kumimoji="0" sz="1800" b="0" i="0" u="none" strike="noStrike" cap="none" spc="0" normalizeH="0" baseline="0">
             <a:ln>
               <a:noFill/>
             </a:ln>
@@ -5389,7 +6276,7 @@
           <a:buFontTx/>
           <a:buNone/>
           <a:tabLst/>
-          <a:defRPr b="0" baseline="0" cap="none" i="0" spc="0" strike="noStrike" sz="1800" u="none" kumimoji="0" normalizeH="0">
+          <a:defRPr kumimoji="0" sz="1800" b="0" i="0" u="none" strike="noStrike" cap="none" spc="0" normalizeH="0" baseline="0">
             <a:ln>
               <a:noFill/>
             </a:ln>
@@ -5415,7 +6302,7 @@
           <a:buFontTx/>
           <a:buNone/>
           <a:tabLst/>
-          <a:defRPr b="0" baseline="0" cap="none" i="0" spc="0" strike="noStrike" sz="1800" u="none" kumimoji="0" normalizeH="0">
+          <a:defRPr kumimoji="0" sz="1800" b="0" i="0" u="none" strike="noStrike" cap="none" spc="0" normalizeH="0" baseline="0">
             <a:ln>
               <a:noFill/>
             </a:ln>
@@ -5441,7 +6328,7 @@
           <a:buFontTx/>
           <a:buNone/>
           <a:tabLst/>
-          <a:defRPr b="0" baseline="0" cap="none" i="0" spc="0" strike="noStrike" sz="1800" u="none" kumimoji="0" normalizeH="0">
+          <a:defRPr kumimoji="0" sz="1800" b="0" i="0" u="none" strike="noStrike" cap="none" spc="0" normalizeH="0" baseline="0">
             <a:ln>
               <a:noFill/>
             </a:ln>
@@ -5467,7 +6354,7 @@
           <a:buFontTx/>
           <a:buNone/>
           <a:tabLst/>
-          <a:defRPr b="0" baseline="0" cap="none" i="0" spc="0" strike="noStrike" sz="1800" u="none" kumimoji="0" normalizeH="0">
+          <a:defRPr kumimoji="0" sz="1800" b="0" i="0" u="none" strike="noStrike" cap="none" spc="0" normalizeH="0" baseline="0">
             <a:ln>
               <a:noFill/>
             </a:ln>
@@ -5493,7 +6380,7 @@
           <a:buFontTx/>
           <a:buNone/>
           <a:tabLst/>
-          <a:defRPr b="0" baseline="0" cap="none" i="0" spc="0" strike="noStrike" sz="1800" u="none" kumimoji="0" normalizeH="0">
+          <a:defRPr kumimoji="0" sz="1800" b="0" i="0" u="none" strike="noStrike" cap="none" spc="0" normalizeH="0" baseline="0">
             <a:ln>
               <a:noFill/>
             </a:ln>
@@ -5519,7 +6406,7 @@
           <a:buFontTx/>
           <a:buNone/>
           <a:tabLst/>
-          <a:defRPr b="0" baseline="0" cap="none" i="0" spc="0" strike="noStrike" sz="1800" u="none" kumimoji="0" normalizeH="0">
+          <a:defRPr kumimoji="0" sz="1800" b="0" i="0" u="none" strike="noStrike" cap="none" spc="0" normalizeH="0" baseline="0">
             <a:ln>
               <a:noFill/>
             </a:ln>
@@ -5545,7 +6432,7 @@
           <a:buFontTx/>
           <a:buNone/>
           <a:tabLst/>
-          <a:defRPr b="0" baseline="0" cap="none" i="0" spc="0" strike="noStrike" sz="1800" u="none" kumimoji="0" normalizeH="0">
+          <a:defRPr kumimoji="0" sz="1800" b="0" i="0" u="none" strike="noStrike" cap="none" spc="0" normalizeH="0" baseline="0">
             <a:ln>
               <a:noFill/>
             </a:ln>
@@ -5558,9 +6445,15 @@
         </a:lvl9pPr>
       </a:lstStyle>
       <a:style>
-        <a:lnRef idx="0"/>
-        <a:fillRef idx="0"/>
-        <a:effectRef idx="0"/>
+        <a:lnRef idx="0">
+          <a:scrgbClr r="0" g="0" b="0"/>
+        </a:lnRef>
+        <a:fillRef idx="0">
+          <a:scrgbClr r="0" g="0" b="0"/>
+        </a:fillRef>
+        <a:effectRef idx="0">
+          <a:scrgbClr r="0" g="0" b="0"/>
+        </a:effectRef>
         <a:fontRef idx="none"/>
       </a:style>
     </a:spDef>
@@ -5577,7 +6470,7 @@
         <a:effectLst/>
         <a:sp3d/>
       </a:spPr>
-      <a:bodyPr rot="0" spcFirstLastPara="1" vertOverflow="overflow" horzOverflow="overflow" vert="horz" wrap="square" lIns="91439" tIns="45719" rIns="91439" bIns="45719" numCol="1" spcCol="38100" rtlCol="0" anchor="t" upright="0">
+      <a:bodyPr rot="0" spcFirstLastPara="1" vertOverflow="overflow" horzOverflow="overflow" vert="horz" wrap="square" lIns="91439" tIns="45719" rIns="91439" bIns="45719" numCol="1" spcCol="38100" rtlCol="0" anchor="t">
         <a:noAutofit/>
       </a:bodyPr>
       <a:lstStyle>
@@ -5596,7 +6489,7 @@
           <a:buFontTx/>
           <a:buNone/>
           <a:tabLst/>
-          <a:defRPr b="0" baseline="0" cap="none" i="0" spc="0" strike="noStrike" sz="1800" u="none" kumimoji="0" normalizeH="0">
+          <a:defRPr kumimoji="0" sz="1800" b="0" i="0" u="none" strike="noStrike" cap="none" spc="0" normalizeH="0" baseline="0">
             <a:ln>
               <a:noFill/>
             </a:ln>
@@ -5622,7 +6515,7 @@
           <a:buFontTx/>
           <a:buNone/>
           <a:tabLst/>
-          <a:defRPr b="0" baseline="0" cap="none" i="0" spc="0" strike="noStrike" sz="1800" u="none" kumimoji="0" normalizeH="0">
+          <a:defRPr kumimoji="0" sz="1800" b="0" i="0" u="none" strike="noStrike" cap="none" spc="0" normalizeH="0" baseline="0">
             <a:ln>
               <a:noFill/>
             </a:ln>
@@ -5648,7 +6541,7 @@
           <a:buFontTx/>
           <a:buNone/>
           <a:tabLst/>
-          <a:defRPr b="0" baseline="0" cap="none" i="0" spc="0" strike="noStrike" sz="1800" u="none" kumimoji="0" normalizeH="0">
+          <a:defRPr kumimoji="0" sz="1800" b="0" i="0" u="none" strike="noStrike" cap="none" spc="0" normalizeH="0" baseline="0">
             <a:ln>
               <a:noFill/>
             </a:ln>
@@ -5674,7 +6567,7 @@
           <a:buFontTx/>
           <a:buNone/>
           <a:tabLst/>
-          <a:defRPr b="0" baseline="0" cap="none" i="0" spc="0" strike="noStrike" sz="1800" u="none" kumimoji="0" normalizeH="0">
+          <a:defRPr kumimoji="0" sz="1800" b="0" i="0" u="none" strike="noStrike" cap="none" spc="0" normalizeH="0" baseline="0">
             <a:ln>
               <a:noFill/>
             </a:ln>
@@ -5700,7 +6593,7 @@
           <a:buFontTx/>
           <a:buNone/>
           <a:tabLst/>
-          <a:defRPr b="0" baseline="0" cap="none" i="0" spc="0" strike="noStrike" sz="1800" u="none" kumimoji="0" normalizeH="0">
+          <a:defRPr kumimoji="0" sz="1800" b="0" i="0" u="none" strike="noStrike" cap="none" spc="0" normalizeH="0" baseline="0">
             <a:ln>
               <a:noFill/>
             </a:ln>
@@ -5726,7 +6619,7 @@
           <a:buFontTx/>
           <a:buNone/>
           <a:tabLst/>
-          <a:defRPr b="0" baseline="0" cap="none" i="0" spc="0" strike="noStrike" sz="1800" u="none" kumimoji="0" normalizeH="0">
+          <a:defRPr kumimoji="0" sz="1800" b="0" i="0" u="none" strike="noStrike" cap="none" spc="0" normalizeH="0" baseline="0">
             <a:ln>
               <a:noFill/>
             </a:ln>
@@ -5752,7 +6645,7 @@
           <a:buFontTx/>
           <a:buNone/>
           <a:tabLst/>
-          <a:defRPr b="0" baseline="0" cap="none" i="0" spc="0" strike="noStrike" sz="1800" u="none" kumimoji="0" normalizeH="0">
+          <a:defRPr kumimoji="0" sz="1800" b="0" i="0" u="none" strike="noStrike" cap="none" spc="0" normalizeH="0" baseline="0">
             <a:ln>
               <a:noFill/>
             </a:ln>
@@ -5778,7 +6671,7 @@
           <a:buFontTx/>
           <a:buNone/>
           <a:tabLst/>
-          <a:defRPr b="0" baseline="0" cap="none" i="0" spc="0" strike="noStrike" sz="1800" u="none" kumimoji="0" normalizeH="0">
+          <a:defRPr kumimoji="0" sz="1800" b="0" i="0" u="none" strike="noStrike" cap="none" spc="0" normalizeH="0" baseline="0">
             <a:ln>
               <a:noFill/>
             </a:ln>
@@ -5804,7 +6697,7 @@
           <a:buFontTx/>
           <a:buNone/>
           <a:tabLst/>
-          <a:defRPr b="0" baseline="0" cap="none" i="0" spc="0" strike="noStrike" sz="1800" u="none" kumimoji="0" normalizeH="0">
+          <a:defRPr kumimoji="0" sz="1800" b="0" i="0" u="none" strike="noStrike" cap="none" spc="0" normalizeH="0" baseline="0">
             <a:ln>
               <a:noFill/>
             </a:ln>
@@ -5830,7 +6723,7 @@
           <a:buFontTx/>
           <a:buNone/>
           <a:tabLst/>
-          <a:defRPr b="0" baseline="0" cap="none" i="0" spc="0" strike="noStrike" sz="1800" u="none" kumimoji="0" normalizeH="0">
+          <a:defRPr kumimoji="0" sz="1800" b="0" i="0" u="none" strike="noStrike" cap="none" spc="0" normalizeH="0" baseline="0">
             <a:ln>
               <a:noFill/>
             </a:ln>
@@ -5843,9 +6736,15 @@
         </a:lvl9pPr>
       </a:lstStyle>
       <a:style>
-        <a:lnRef idx="0"/>
-        <a:fillRef idx="0"/>
-        <a:effectRef idx="0"/>
+        <a:lnRef idx="0">
+          <a:scrgbClr r="0" g="0" b="0"/>
+        </a:lnRef>
+        <a:fillRef idx="0">
+          <a:scrgbClr r="0" g="0" b="0"/>
+        </a:fillRef>
+        <a:effectRef idx="0">
+          <a:scrgbClr r="0" g="0" b="0"/>
+        </a:effectRef>
         <a:fontRef idx="none"/>
       </a:style>
     </a:lnDef>
@@ -5859,7 +6758,7 @@
         <a:effectLst/>
         <a:sp3d/>
       </a:spPr>
-      <a:bodyPr rot="0" spcFirstLastPara="1" vertOverflow="overflow" horzOverflow="overflow" vert="horz" wrap="square" lIns="45719" tIns="45719" rIns="45719" bIns="45719" numCol="1" spcCol="38100" rtlCol="0" anchor="t" upright="0">
+      <a:bodyPr rot="0" spcFirstLastPara="1" vertOverflow="overflow" horzOverflow="overflow" vert="horz" wrap="square" lIns="45719" tIns="45719" rIns="45719" bIns="45719" numCol="1" spcCol="38100" rtlCol="0" anchor="t">
         <a:spAutoFit/>
       </a:bodyPr>
       <a:lstStyle>
@@ -5878,7 +6777,7 @@
           <a:buFontTx/>
           <a:buNone/>
           <a:tabLst/>
-          <a:defRPr b="0" baseline="0" cap="none" i="0" spc="0" strike="noStrike" sz="1800" u="none" kumimoji="0" normalizeH="0">
+          <a:defRPr kumimoji="0" sz="1800" b="0" i="0" u="none" strike="noStrike" cap="none" spc="0" normalizeH="0" baseline="0">
             <a:ln>
               <a:noFill/>
             </a:ln>
@@ -5908,7 +6807,7 @@
           <a:buFontTx/>
           <a:buNone/>
           <a:tabLst/>
-          <a:defRPr b="0" baseline="0" cap="none" i="0" spc="0" strike="noStrike" sz="1800" u="none" kumimoji="0" normalizeH="0">
+          <a:defRPr kumimoji="0" sz="1800" b="0" i="0" u="none" strike="noStrike" cap="none" spc="0" normalizeH="0" baseline="0">
             <a:ln>
               <a:noFill/>
             </a:ln>
@@ -5934,7 +6833,7 @@
           <a:buFontTx/>
           <a:buNone/>
           <a:tabLst/>
-          <a:defRPr b="0" baseline="0" cap="none" i="0" spc="0" strike="noStrike" sz="1800" u="none" kumimoji="0" normalizeH="0">
+          <a:defRPr kumimoji="0" sz="1800" b="0" i="0" u="none" strike="noStrike" cap="none" spc="0" normalizeH="0" baseline="0">
             <a:ln>
               <a:noFill/>
             </a:ln>
@@ -5960,7 +6859,7 @@
           <a:buFontTx/>
           <a:buNone/>
           <a:tabLst/>
-          <a:defRPr b="0" baseline="0" cap="none" i="0" spc="0" strike="noStrike" sz="1800" u="none" kumimoji="0" normalizeH="0">
+          <a:defRPr kumimoji="0" sz="1800" b="0" i="0" u="none" strike="noStrike" cap="none" spc="0" normalizeH="0" baseline="0">
             <a:ln>
               <a:noFill/>
             </a:ln>
@@ -5986,7 +6885,7 @@
           <a:buFontTx/>
           <a:buNone/>
           <a:tabLst/>
-          <a:defRPr b="0" baseline="0" cap="none" i="0" spc="0" strike="noStrike" sz="1800" u="none" kumimoji="0" normalizeH="0">
+          <a:defRPr kumimoji="0" sz="1800" b="0" i="0" u="none" strike="noStrike" cap="none" spc="0" normalizeH="0" baseline="0">
             <a:ln>
               <a:noFill/>
             </a:ln>
@@ -6012,7 +6911,7 @@
           <a:buFontTx/>
           <a:buNone/>
           <a:tabLst/>
-          <a:defRPr b="0" baseline="0" cap="none" i="0" spc="0" strike="noStrike" sz="1800" u="none" kumimoji="0" normalizeH="0">
+          <a:defRPr kumimoji="0" sz="1800" b="0" i="0" u="none" strike="noStrike" cap="none" spc="0" normalizeH="0" baseline="0">
             <a:ln>
               <a:noFill/>
             </a:ln>
@@ -6038,7 +6937,7 @@
           <a:buFontTx/>
           <a:buNone/>
           <a:tabLst/>
-          <a:defRPr b="0" baseline="0" cap="none" i="0" spc="0" strike="noStrike" sz="1800" u="none" kumimoji="0" normalizeH="0">
+          <a:defRPr kumimoji="0" sz="1800" b="0" i="0" u="none" strike="noStrike" cap="none" spc="0" normalizeH="0" baseline="0">
             <a:ln>
               <a:noFill/>
             </a:ln>
@@ -6064,7 +6963,7 @@
           <a:buFontTx/>
           <a:buNone/>
           <a:tabLst/>
-          <a:defRPr b="0" baseline="0" cap="none" i="0" spc="0" strike="noStrike" sz="1800" u="none" kumimoji="0" normalizeH="0">
+          <a:defRPr kumimoji="0" sz="1800" b="0" i="0" u="none" strike="noStrike" cap="none" spc="0" normalizeH="0" baseline="0">
             <a:ln>
               <a:noFill/>
             </a:ln>
@@ -6090,7 +6989,7 @@
           <a:buFontTx/>
           <a:buNone/>
           <a:tabLst/>
-          <a:defRPr b="0" baseline="0" cap="none" i="0" spc="0" strike="noStrike" sz="1800" u="none" kumimoji="0" normalizeH="0">
+          <a:defRPr kumimoji="0" sz="1800" b="0" i="0" u="none" strike="noStrike" cap="none" spc="0" normalizeH="0" baseline="0">
             <a:ln>
               <a:noFill/>
             </a:ln>
@@ -6116,7 +7015,7 @@
           <a:buFontTx/>
           <a:buNone/>
           <a:tabLst/>
-          <a:defRPr b="0" baseline="0" cap="none" i="0" spc="0" strike="noStrike" sz="1800" u="none" kumimoji="0" normalizeH="0">
+          <a:defRPr kumimoji="0" sz="1800" b="0" i="0" u="none" strike="noStrike" cap="none" spc="0" normalizeH="0" baseline="0">
             <a:ln>
               <a:noFill/>
             </a:ln>
@@ -6129,12 +7028,19 @@
         </a:lvl9pPr>
       </a:lstStyle>
       <a:style>
-        <a:lnRef idx="0"/>
-        <a:fillRef idx="0"/>
-        <a:effectRef idx="0"/>
+        <a:lnRef idx="0">
+          <a:scrgbClr r="0" g="0" b="0"/>
+        </a:lnRef>
+        <a:fillRef idx="0">
+          <a:scrgbClr r="0" g="0" b="0"/>
+        </a:fillRef>
+        <a:effectRef idx="0">
+          <a:scrgbClr r="0" g="0" b="0"/>
+        </a:effectRef>
         <a:fontRef idx="none"/>
       </a:style>
     </a:txDef>
   </a:objectDefaults>
+  <a:extraClrSchemeLst/>
 </a:theme>
 </file>
</xml_diff>